<commit_message>
Updated the slides and continued to add comments to the code
</commit_message>
<xml_diff>
--- a/Covid-19 and the NYC Apartment Market.pptx
+++ b/Covid-19 and the NYC Apartment Market.pptx
@@ -5,7 +5,7 @@
     <p:sldMasterId id="2147483799" r:id="rId1"/>
   </p:sldMasterIdLst>
   <p:notesMasterIdLst>
-    <p:notesMasterId r:id="rId10"/>
+    <p:notesMasterId r:id="rId14"/>
   </p:notesMasterIdLst>
   <p:sldIdLst>
     <p:sldId id="256" r:id="rId2"/>
@@ -16,6 +16,10 @@
     <p:sldId id="261" r:id="rId7"/>
     <p:sldId id="262" r:id="rId8"/>
     <p:sldId id="263" r:id="rId9"/>
+    <p:sldId id="264" r:id="rId10"/>
+    <p:sldId id="267" r:id="rId11"/>
+    <p:sldId id="266" r:id="rId12"/>
+    <p:sldId id="268" r:id="rId13"/>
   </p:sldIdLst>
   <p:sldSz cx="12192000" cy="6858000"/>
   <p:notesSz cx="6858000" cy="9144000"/>
@@ -125,7 +129,7 @@
 <file path=ppt/revisionInfo.xml><?xml version="1.0" encoding="utf-8"?>
 <p1510:revInfo xmlns:a="http://schemas.openxmlformats.org/drawingml/2006/main" xmlns:r="http://schemas.openxmlformats.org/officeDocument/2006/relationships" xmlns:p1510="http://schemas.microsoft.com/office/powerpoint/2015/10/main">
   <p1510:revLst>
-    <p1510:client id="{61313348-D28B-4C2B-88EF-82071CA11326}" v="12" dt="2021-10-15T19:36:21.266"/>
+    <p1510:client id="{61313348-D28B-4C2B-88EF-82071CA11326}" v="35" dt="2021-10-15T20:03:00.016"/>
   </p1510:revLst>
 </p1510:revInfo>
 </file>
@@ -134,11 +138,26 @@
 <pc:chgInfo xmlns:a="http://schemas.openxmlformats.org/drawingml/2006/main" xmlns:r="http://schemas.openxmlformats.org/officeDocument/2006/relationships" xmlns:ac="http://schemas.microsoft.com/office/drawing/2013/main/command" xmlns:pc="http://schemas.microsoft.com/office/powerpoint/2013/main/command">
   <pc:docChgLst>
     <pc:chgData name="jack copeland" userId="c1f67f945e5b5c42" providerId="LiveId" clId="{61313348-D28B-4C2B-88EF-82071CA11326}"/>
-    <pc:docChg chg="undo custSel addSld modSld sldOrd">
-      <pc:chgData name="jack copeland" userId="c1f67f945e5b5c42" providerId="LiveId" clId="{61313348-D28B-4C2B-88EF-82071CA11326}" dt="2021-10-15T19:36:32.879" v="600" actId="20577"/>
+    <pc:docChg chg="undo redo custSel addSld delSld modSld sldOrd">
+      <pc:chgData name="jack copeland" userId="c1f67f945e5b5c42" providerId="LiveId" clId="{61313348-D28B-4C2B-88EF-82071CA11326}" dt="2021-10-15T20:03:00.015" v="1833" actId="20577"/>
       <pc:docMkLst>
         <pc:docMk/>
       </pc:docMkLst>
+      <pc:sldChg chg="modSp">
+        <pc:chgData name="jack copeland" userId="c1f67f945e5b5c42" providerId="LiveId" clId="{61313348-D28B-4C2B-88EF-82071CA11326}" dt="2021-10-15T20:03:00.015" v="1833" actId="20577"/>
+        <pc:sldMkLst>
+          <pc:docMk/>
+          <pc:sldMk cId="2410825078" sldId="257"/>
+        </pc:sldMkLst>
+        <pc:graphicFrameChg chg="mod">
+          <ac:chgData name="jack copeland" userId="c1f67f945e5b5c42" providerId="LiveId" clId="{61313348-D28B-4C2B-88EF-82071CA11326}" dt="2021-10-15T20:03:00.015" v="1833" actId="20577"/>
+          <ac:graphicFrameMkLst>
+            <pc:docMk/>
+            <pc:sldMk cId="2410825078" sldId="257"/>
+            <ac:graphicFrameMk id="4" creationId="{3E6131AB-8164-4B6B-8E68-5AE0D422DE4B}"/>
+          </ac:graphicFrameMkLst>
+        </pc:graphicFrameChg>
+      </pc:sldChg>
       <pc:sldChg chg="addSp delSp modSp mod">
         <pc:chgData name="jack copeland" userId="c1f67f945e5b5c42" providerId="LiveId" clId="{61313348-D28B-4C2B-88EF-82071CA11326}" dt="2021-10-15T18:39:57.254" v="40" actId="1076"/>
         <pc:sldMkLst>
@@ -344,8 +363,8 @@
           </ac:picMkLst>
         </pc:picChg>
       </pc:sldChg>
-      <pc:sldChg chg="delSp modSp add mod">
-        <pc:chgData name="jack copeland" userId="c1f67f945e5b5c42" providerId="LiveId" clId="{61313348-D28B-4C2B-88EF-82071CA11326}" dt="2021-10-15T19:36:32.879" v="600" actId="20577"/>
+      <pc:sldChg chg="addSp delSp modSp add mod">
+        <pc:chgData name="jack copeland" userId="c1f67f945e5b5c42" providerId="LiveId" clId="{61313348-D28B-4C2B-88EF-82071CA11326}" dt="2021-10-15T19:42:24.577" v="954" actId="404"/>
         <pc:sldMkLst>
           <pc:docMk/>
           <pc:sldMk cId="3472992963" sldId="263"/>
@@ -372,6 +391,14 @@
             <pc:docMk/>
             <pc:sldMk cId="3472992963" sldId="263"/>
             <ac:spMk id="5" creationId="{3FACFDE9-4AB9-4A9F-960E-7C0140DA598C}"/>
+          </ac:spMkLst>
+        </pc:spChg>
+        <pc:spChg chg="add mod">
+          <ac:chgData name="jack copeland" userId="c1f67f945e5b5c42" providerId="LiveId" clId="{61313348-D28B-4C2B-88EF-82071CA11326}" dt="2021-10-15T19:42:24.577" v="954" actId="404"/>
+          <ac:spMkLst>
+            <pc:docMk/>
+            <pc:sldMk cId="3472992963" sldId="263"/>
+            <ac:spMk id="5" creationId="{B2E9AF01-269C-41F1-AE19-40DA7D48E507}"/>
           </ac:spMkLst>
         </pc:spChg>
         <pc:spChg chg="del">
@@ -430,6 +457,489 @@
             <ac:spMk id="21" creationId="{1EFBDC71-4252-491E-96B8-C1DE650265B5}"/>
           </ac:spMkLst>
         </pc:spChg>
+        <pc:picChg chg="add mod">
+          <ac:chgData name="jack copeland" userId="c1f67f945e5b5c42" providerId="LiveId" clId="{61313348-D28B-4C2B-88EF-82071CA11326}" dt="2021-10-15T19:39:53.687" v="610" actId="1076"/>
+          <ac:picMkLst>
+            <pc:docMk/>
+            <pc:sldMk cId="3472992963" sldId="263"/>
+            <ac:picMk id="4" creationId="{5BF8F774-5544-44EE-A728-A59B0D471603}"/>
+          </ac:picMkLst>
+        </pc:picChg>
+      </pc:sldChg>
+      <pc:sldChg chg="addSp modSp add mod">
+        <pc:chgData name="jack copeland" userId="c1f67f945e5b5c42" providerId="LiveId" clId="{61313348-D28B-4C2B-88EF-82071CA11326}" dt="2021-10-15T19:47:27.800" v="1340" actId="5793"/>
+        <pc:sldMkLst>
+          <pc:docMk/>
+          <pc:sldMk cId="2285805491" sldId="264"/>
+        </pc:sldMkLst>
+        <pc:spChg chg="mod">
+          <ac:chgData name="jack copeland" userId="c1f67f945e5b5c42" providerId="LiveId" clId="{61313348-D28B-4C2B-88EF-82071CA11326}" dt="2021-10-15T19:43:54.454" v="977" actId="20577"/>
+          <ac:spMkLst>
+            <pc:docMk/>
+            <pc:sldMk cId="2285805491" sldId="264"/>
+            <ac:spMk id="2" creationId="{92A9B60F-7F68-48F6-9FB9-2CF291C61653}"/>
+          </ac:spMkLst>
+        </pc:spChg>
+        <pc:spChg chg="mod">
+          <ac:chgData name="jack copeland" userId="c1f67f945e5b5c42" providerId="LiveId" clId="{61313348-D28B-4C2B-88EF-82071CA11326}" dt="2021-10-15T19:47:27.800" v="1340" actId="5793"/>
+          <ac:spMkLst>
+            <pc:docMk/>
+            <pc:sldMk cId="2285805491" sldId="264"/>
+            <ac:spMk id="5" creationId="{B2E9AF01-269C-41F1-AE19-40DA7D48E507}"/>
+          </ac:spMkLst>
+        </pc:spChg>
+        <pc:picChg chg="mod">
+          <ac:chgData name="jack copeland" userId="c1f67f945e5b5c42" providerId="LiveId" clId="{61313348-D28B-4C2B-88EF-82071CA11326}" dt="2021-10-15T19:45:25.528" v="978" actId="14826"/>
+          <ac:picMkLst>
+            <pc:docMk/>
+            <pc:sldMk cId="2285805491" sldId="264"/>
+            <ac:picMk id="4" creationId="{5BF8F774-5544-44EE-A728-A59B0D471603}"/>
+          </ac:picMkLst>
+        </pc:picChg>
+        <pc:cxnChg chg="add mod">
+          <ac:chgData name="jack copeland" userId="c1f67f945e5b5c42" providerId="LiveId" clId="{61313348-D28B-4C2B-88EF-82071CA11326}" dt="2021-10-15T19:46:10.774" v="985" actId="208"/>
+          <ac:cxnSpMkLst>
+            <pc:docMk/>
+            <pc:sldMk cId="2285805491" sldId="264"/>
+            <ac:cxnSpMk id="6" creationId="{7110F110-0206-4F8D-8B70-EEF84A281CF2}"/>
+          </ac:cxnSpMkLst>
+        </pc:cxnChg>
+      </pc:sldChg>
+      <pc:sldChg chg="add del">
+        <pc:chgData name="jack copeland" userId="c1f67f945e5b5c42" providerId="LiveId" clId="{61313348-D28B-4C2B-88EF-82071CA11326}" dt="2021-10-15T19:54:53.752" v="1460" actId="47"/>
+        <pc:sldMkLst>
+          <pc:docMk/>
+          <pc:sldMk cId="3198867209" sldId="265"/>
+        </pc:sldMkLst>
+      </pc:sldChg>
+      <pc:sldChg chg="addSp delSp modSp add mod setBg">
+        <pc:chgData name="jack copeland" userId="c1f67f945e5b5c42" providerId="LiveId" clId="{61313348-D28B-4C2B-88EF-82071CA11326}" dt="2021-10-15T19:59:05.837" v="1764" actId="1076"/>
+        <pc:sldMkLst>
+          <pc:docMk/>
+          <pc:sldMk cId="3937668167" sldId="266"/>
+        </pc:sldMkLst>
+        <pc:spChg chg="mod">
+          <ac:chgData name="jack copeland" userId="c1f67f945e5b5c42" providerId="LiveId" clId="{61313348-D28B-4C2B-88EF-82071CA11326}" dt="2021-10-15T19:53:06.178" v="1375" actId="26606"/>
+          <ac:spMkLst>
+            <pc:docMk/>
+            <pc:sldMk cId="3937668167" sldId="266"/>
+            <ac:spMk id="2" creationId="{92A9B60F-7F68-48F6-9FB9-2CF291C61653}"/>
+          </ac:spMkLst>
+        </pc:spChg>
+        <pc:spChg chg="del">
+          <ac:chgData name="jack copeland" userId="c1f67f945e5b5c42" providerId="LiveId" clId="{61313348-D28B-4C2B-88EF-82071CA11326}" dt="2021-10-15T19:51:20.783" v="1349" actId="478"/>
+          <ac:spMkLst>
+            <pc:docMk/>
+            <pc:sldMk cId="3937668167" sldId="266"/>
+            <ac:spMk id="5" creationId="{B2E9AF01-269C-41F1-AE19-40DA7D48E507}"/>
+          </ac:spMkLst>
+        </pc:spChg>
+        <pc:spChg chg="add del mod">
+          <ac:chgData name="jack copeland" userId="c1f67f945e5b5c42" providerId="LiveId" clId="{61313348-D28B-4C2B-88EF-82071CA11326}" dt="2021-10-15T19:55:53.470" v="1513" actId="478"/>
+          <ac:spMkLst>
+            <pc:docMk/>
+            <pc:sldMk cId="3937668167" sldId="266"/>
+            <ac:spMk id="8" creationId="{B0BA38DA-91D7-4AA3-AC6D-9C9CD8956C18}"/>
+          </ac:spMkLst>
+        </pc:spChg>
+        <pc:spChg chg="add del">
+          <ac:chgData name="jack copeland" userId="c1f67f945e5b5c42" providerId="LiveId" clId="{61313348-D28B-4C2B-88EF-82071CA11326}" dt="2021-10-15T19:52:48.308" v="1365" actId="26606"/>
+          <ac:spMkLst>
+            <pc:docMk/>
+            <pc:sldMk cId="3937668167" sldId="266"/>
+            <ac:spMk id="12" creationId="{BB2B8762-61F0-4F1B-9364-D633EE9D6AF5}"/>
+          </ac:spMkLst>
+        </pc:spChg>
+        <pc:spChg chg="add del">
+          <ac:chgData name="jack copeland" userId="c1f67f945e5b5c42" providerId="LiveId" clId="{61313348-D28B-4C2B-88EF-82071CA11326}" dt="2021-10-15T19:52:48.308" v="1365" actId="26606"/>
+          <ac:spMkLst>
+            <pc:docMk/>
+            <pc:sldMk cId="3937668167" sldId="266"/>
+            <ac:spMk id="14" creationId="{E97675C8-1328-460C-9EBF-6B446B67EAD3}"/>
+          </ac:spMkLst>
+        </pc:spChg>
+        <pc:spChg chg="add del">
+          <ac:chgData name="jack copeland" userId="c1f67f945e5b5c42" providerId="LiveId" clId="{61313348-D28B-4C2B-88EF-82071CA11326}" dt="2021-10-15T19:52:48.308" v="1365" actId="26606"/>
+          <ac:spMkLst>
+            <pc:docMk/>
+            <pc:sldMk cId="3937668167" sldId="266"/>
+            <ac:spMk id="18" creationId="{20136764-CEC5-462E-AEA9-4AA1CF15E312}"/>
+          </ac:spMkLst>
+        </pc:spChg>
+        <pc:spChg chg="add del">
+          <ac:chgData name="jack copeland" userId="c1f67f945e5b5c42" providerId="LiveId" clId="{61313348-D28B-4C2B-88EF-82071CA11326}" dt="2021-10-15T19:52:48.308" v="1365" actId="26606"/>
+          <ac:spMkLst>
+            <pc:docMk/>
+            <pc:sldMk cId="3937668167" sldId="266"/>
+            <ac:spMk id="20" creationId="{12E2F1EB-DD93-49F9-8F7D-3DE282902466}"/>
+          </ac:spMkLst>
+        </pc:spChg>
+        <pc:spChg chg="add del">
+          <ac:chgData name="jack copeland" userId="c1f67f945e5b5c42" providerId="LiveId" clId="{61313348-D28B-4C2B-88EF-82071CA11326}" dt="2021-10-15T19:52:48.308" v="1365" actId="26606"/>
+          <ac:spMkLst>
+            <pc:docMk/>
+            <pc:sldMk cId="3937668167" sldId="266"/>
+            <ac:spMk id="22" creationId="{10D82C66-EAC6-46C6-AC04-27A5632D486D}"/>
+          </ac:spMkLst>
+        </pc:spChg>
+        <pc:spChg chg="add del">
+          <ac:chgData name="jack copeland" userId="c1f67f945e5b5c42" providerId="LiveId" clId="{61313348-D28B-4C2B-88EF-82071CA11326}" dt="2021-10-15T19:52:48.308" v="1365" actId="26606"/>
+          <ac:spMkLst>
+            <pc:docMk/>
+            <pc:sldMk cId="3937668167" sldId="266"/>
+            <ac:spMk id="24" creationId="{DCF2CA89-CD8C-40CF-8273-C3FA6690BF77}"/>
+          </ac:spMkLst>
+        </pc:spChg>
+        <pc:spChg chg="add del">
+          <ac:chgData name="jack copeland" userId="c1f67f945e5b5c42" providerId="LiveId" clId="{61313348-D28B-4C2B-88EF-82071CA11326}" dt="2021-10-15T19:52:48.308" v="1365" actId="26606"/>
+          <ac:spMkLst>
+            <pc:docMk/>
+            <pc:sldMk cId="3937668167" sldId="266"/>
+            <ac:spMk id="26" creationId="{1A82F9E0-1CBD-4E82-B740-B329F65F5FB0}"/>
+          </ac:spMkLst>
+        </pc:spChg>
+        <pc:spChg chg="add del">
+          <ac:chgData name="jack copeland" userId="c1f67f945e5b5c42" providerId="LiveId" clId="{61313348-D28B-4C2B-88EF-82071CA11326}" dt="2021-10-15T19:52:48.308" v="1365" actId="26606"/>
+          <ac:spMkLst>
+            <pc:docMk/>
+            <pc:sldMk cId="3937668167" sldId="266"/>
+            <ac:spMk id="28" creationId="{38EE5F1E-8455-462D-8415-D85B2D4B9C9A}"/>
+          </ac:spMkLst>
+        </pc:spChg>
+        <pc:spChg chg="add del">
+          <ac:chgData name="jack copeland" userId="c1f67f945e5b5c42" providerId="LiveId" clId="{61313348-D28B-4C2B-88EF-82071CA11326}" dt="2021-10-15T19:52:48.308" v="1365" actId="26606"/>
+          <ac:spMkLst>
+            <pc:docMk/>
+            <pc:sldMk cId="3937668167" sldId="266"/>
+            <ac:spMk id="30" creationId="{5404E500-F0A1-42F1-8F1A-179948E39571}"/>
+          </ac:spMkLst>
+        </pc:spChg>
+        <pc:spChg chg="add del">
+          <ac:chgData name="jack copeland" userId="c1f67f945e5b5c42" providerId="LiveId" clId="{61313348-D28B-4C2B-88EF-82071CA11326}" dt="2021-10-15T19:52:51.053" v="1367" actId="26606"/>
+          <ac:spMkLst>
+            <pc:docMk/>
+            <pc:sldMk cId="3937668167" sldId="266"/>
+            <ac:spMk id="32" creationId="{BB2B8762-61F0-4F1B-9364-D633EE9D6AF5}"/>
+          </ac:spMkLst>
+        </pc:spChg>
+        <pc:spChg chg="add del">
+          <ac:chgData name="jack copeland" userId="c1f67f945e5b5c42" providerId="LiveId" clId="{61313348-D28B-4C2B-88EF-82071CA11326}" dt="2021-10-15T19:52:51.053" v="1367" actId="26606"/>
+          <ac:spMkLst>
+            <pc:docMk/>
+            <pc:sldMk cId="3937668167" sldId="266"/>
+            <ac:spMk id="33" creationId="{E97675C8-1328-460C-9EBF-6B446B67EAD3}"/>
+          </ac:spMkLst>
+        </pc:spChg>
+        <pc:spChg chg="add del">
+          <ac:chgData name="jack copeland" userId="c1f67f945e5b5c42" providerId="LiveId" clId="{61313348-D28B-4C2B-88EF-82071CA11326}" dt="2021-10-15T19:52:51.053" v="1367" actId="26606"/>
+          <ac:spMkLst>
+            <pc:docMk/>
+            <pc:sldMk cId="3937668167" sldId="266"/>
+            <ac:spMk id="35" creationId="{2AD83CFE-1CA3-4832-A4B9-C48CD1347C03}"/>
+          </ac:spMkLst>
+        </pc:spChg>
+        <pc:spChg chg="add del">
+          <ac:chgData name="jack copeland" userId="c1f67f945e5b5c42" providerId="LiveId" clId="{61313348-D28B-4C2B-88EF-82071CA11326}" dt="2021-10-15T19:52:51.053" v="1367" actId="26606"/>
+          <ac:spMkLst>
+            <pc:docMk/>
+            <pc:sldMk cId="3937668167" sldId="266"/>
+            <ac:spMk id="36" creationId="{BC98641C-7F74-435D-996F-A4387A3C3C26}"/>
+          </ac:spMkLst>
+        </pc:spChg>
+        <pc:spChg chg="add del">
+          <ac:chgData name="jack copeland" userId="c1f67f945e5b5c42" providerId="LiveId" clId="{61313348-D28B-4C2B-88EF-82071CA11326}" dt="2021-10-15T19:52:51.053" v="1367" actId="26606"/>
+          <ac:spMkLst>
+            <pc:docMk/>
+            <pc:sldMk cId="3937668167" sldId="266"/>
+            <ac:spMk id="37" creationId="{F530C0F6-C8DF-4539-B30C-8105DB618C20}"/>
+          </ac:spMkLst>
+        </pc:spChg>
+        <pc:spChg chg="add del">
+          <ac:chgData name="jack copeland" userId="c1f67f945e5b5c42" providerId="LiveId" clId="{61313348-D28B-4C2B-88EF-82071CA11326}" dt="2021-10-15T19:52:51.053" v="1367" actId="26606"/>
+          <ac:spMkLst>
+            <pc:docMk/>
+            <pc:sldMk cId="3937668167" sldId="266"/>
+            <ac:spMk id="38" creationId="{BAE51241-AA8B-4B82-9C59-6738DB85674C}"/>
+          </ac:spMkLst>
+        </pc:spChg>
+        <pc:spChg chg="add mod">
+          <ac:chgData name="jack copeland" userId="c1f67f945e5b5c42" providerId="LiveId" clId="{61313348-D28B-4C2B-88EF-82071CA11326}" dt="2021-10-15T19:59:05.837" v="1764" actId="1076"/>
+          <ac:spMkLst>
+            <pc:docMk/>
+            <pc:sldMk cId="3937668167" sldId="266"/>
+            <ac:spMk id="39" creationId="{7DCC5B35-660B-48B1-B480-FE9EA1C104AC}"/>
+          </ac:spMkLst>
+        </pc:spChg>
+        <pc:spChg chg="add del">
+          <ac:chgData name="jack copeland" userId="c1f67f945e5b5c42" providerId="LiveId" clId="{61313348-D28B-4C2B-88EF-82071CA11326}" dt="2021-10-15T19:53:06.178" v="1375" actId="26606"/>
+          <ac:spMkLst>
+            <pc:docMk/>
+            <pc:sldMk cId="3937668167" sldId="266"/>
+            <ac:spMk id="40" creationId="{BB2B8762-61F0-4F1B-9364-D633EE9D6AF5}"/>
+          </ac:spMkLst>
+        </pc:spChg>
+        <pc:spChg chg="add del">
+          <ac:chgData name="jack copeland" userId="c1f67f945e5b5c42" providerId="LiveId" clId="{61313348-D28B-4C2B-88EF-82071CA11326}" dt="2021-10-15T19:53:06.178" v="1375" actId="26606"/>
+          <ac:spMkLst>
+            <pc:docMk/>
+            <pc:sldMk cId="3937668167" sldId="266"/>
+            <ac:spMk id="41" creationId="{E97675C8-1328-460C-9EBF-6B446B67EAD3}"/>
+          </ac:spMkLst>
+        </pc:spChg>
+        <pc:spChg chg="add del">
+          <ac:chgData name="jack copeland" userId="c1f67f945e5b5c42" providerId="LiveId" clId="{61313348-D28B-4C2B-88EF-82071CA11326}" dt="2021-10-15T19:53:06.178" v="1375" actId="26606"/>
+          <ac:spMkLst>
+            <pc:docMk/>
+            <pc:sldMk cId="3937668167" sldId="266"/>
+            <ac:spMk id="43" creationId="{C6417104-D4C1-4710-9982-2154A7F48492}"/>
+          </ac:spMkLst>
+        </pc:spChg>
+        <pc:spChg chg="add del">
+          <ac:chgData name="jack copeland" userId="c1f67f945e5b5c42" providerId="LiveId" clId="{61313348-D28B-4C2B-88EF-82071CA11326}" dt="2021-10-15T19:53:06.178" v="1375" actId="26606"/>
+          <ac:spMkLst>
+            <pc:docMk/>
+            <pc:sldMk cId="3937668167" sldId="266"/>
+            <ac:spMk id="44" creationId="{626F1402-2DEC-4071-84AF-350C7BF00D43}"/>
+          </ac:spMkLst>
+        </pc:spChg>
+        <pc:spChg chg="add del">
+          <ac:chgData name="jack copeland" userId="c1f67f945e5b5c42" providerId="LiveId" clId="{61313348-D28B-4C2B-88EF-82071CA11326}" dt="2021-10-15T19:53:06.178" v="1375" actId="26606"/>
+          <ac:spMkLst>
+            <pc:docMk/>
+            <pc:sldMk cId="3937668167" sldId="266"/>
+            <ac:spMk id="46" creationId="{DA52A394-10F4-4AA5-90E4-634D1E919DBA}"/>
+          </ac:spMkLst>
+        </pc:spChg>
+        <pc:spChg chg="add del">
+          <ac:chgData name="jack copeland" userId="c1f67f945e5b5c42" providerId="LiveId" clId="{61313348-D28B-4C2B-88EF-82071CA11326}" dt="2021-10-15T19:53:06.178" v="1375" actId="26606"/>
+          <ac:spMkLst>
+            <pc:docMk/>
+            <pc:sldMk cId="3937668167" sldId="266"/>
+            <ac:spMk id="47" creationId="{07BDDC51-8BB2-42BE-8EA8-39B3E9AC1EF6}"/>
+          </ac:spMkLst>
+        </pc:spChg>
+        <pc:spChg chg="add mod">
+          <ac:chgData name="jack copeland" userId="c1f67f945e5b5c42" providerId="LiveId" clId="{61313348-D28B-4C2B-88EF-82071CA11326}" dt="2021-10-15T19:59:01.704" v="1762" actId="1076"/>
+          <ac:spMkLst>
+            <pc:docMk/>
+            <pc:sldMk cId="3937668167" sldId="266"/>
+            <ac:spMk id="49" creationId="{371C004D-6EFA-4601-9F34-A6BEA448D4FB}"/>
+          </ac:spMkLst>
+        </pc:spChg>
+        <pc:picChg chg="add del mod">
+          <ac:chgData name="jack copeland" userId="c1f67f945e5b5c42" providerId="LiveId" clId="{61313348-D28B-4C2B-88EF-82071CA11326}" dt="2021-10-15T19:55:52.408" v="1512" actId="478"/>
+          <ac:picMkLst>
+            <pc:docMk/>
+            <pc:sldMk cId="3937668167" sldId="266"/>
+            <ac:picMk id="4" creationId="{5BF8F774-5544-44EE-A728-A59B0D471603}"/>
+          </ac:picMkLst>
+        </pc:picChg>
+        <pc:picChg chg="add mod">
+          <ac:chgData name="jack copeland" userId="c1f67f945e5b5c42" providerId="LiveId" clId="{61313348-D28B-4C2B-88EF-82071CA11326}" dt="2021-10-15T19:59:03.213" v="1763" actId="1076"/>
+          <ac:picMkLst>
+            <pc:docMk/>
+            <pc:sldMk cId="3937668167" sldId="266"/>
+            <ac:picMk id="7" creationId="{0EEEFFFE-362A-42AF-B2A2-FD58FAE57F09}"/>
+          </ac:picMkLst>
+        </pc:picChg>
+        <pc:picChg chg="add mod">
+          <ac:chgData name="jack copeland" userId="c1f67f945e5b5c42" providerId="LiveId" clId="{61313348-D28B-4C2B-88EF-82071CA11326}" dt="2021-10-15T19:58:59.943" v="1761" actId="1076"/>
+          <ac:picMkLst>
+            <pc:docMk/>
+            <pc:sldMk cId="3937668167" sldId="266"/>
+            <ac:picMk id="48" creationId="{4F858A45-48DC-4EDC-8377-97E9A5ECD36B}"/>
+          </ac:picMkLst>
+        </pc:picChg>
+        <pc:cxnChg chg="add del">
+          <ac:chgData name="jack copeland" userId="c1f67f945e5b5c42" providerId="LiveId" clId="{61313348-D28B-4C2B-88EF-82071CA11326}" dt="2021-10-15T19:51:00.966" v="1347" actId="478"/>
+          <ac:cxnSpMkLst>
+            <pc:docMk/>
+            <pc:sldMk cId="3937668167" sldId="266"/>
+            <ac:cxnSpMk id="6" creationId="{7110F110-0206-4F8D-8B70-EEF84A281CF2}"/>
+          </ac:cxnSpMkLst>
+        </pc:cxnChg>
+        <pc:cxnChg chg="add del">
+          <ac:chgData name="jack copeland" userId="c1f67f945e5b5c42" providerId="LiveId" clId="{61313348-D28B-4C2B-88EF-82071CA11326}" dt="2021-10-15T19:52:48.308" v="1365" actId="26606"/>
+          <ac:cxnSpMkLst>
+            <pc:docMk/>
+            <pc:sldMk cId="3937668167" sldId="266"/>
+            <ac:cxnSpMk id="16" creationId="{514EE78B-AF71-4195-A01B-F1165D9233BF}"/>
+          </ac:cxnSpMkLst>
+        </pc:cxnChg>
+        <pc:cxnChg chg="add del">
+          <ac:chgData name="jack copeland" userId="c1f67f945e5b5c42" providerId="LiveId" clId="{61313348-D28B-4C2B-88EF-82071CA11326}" dt="2021-10-15T19:52:51.053" v="1367" actId="26606"/>
+          <ac:cxnSpMkLst>
+            <pc:docMk/>
+            <pc:sldMk cId="3937668167" sldId="266"/>
+            <ac:cxnSpMk id="34" creationId="{514EE78B-AF71-4195-A01B-F1165D9233BF}"/>
+          </ac:cxnSpMkLst>
+        </pc:cxnChg>
+        <pc:cxnChg chg="add del">
+          <ac:chgData name="jack copeland" userId="c1f67f945e5b5c42" providerId="LiveId" clId="{61313348-D28B-4C2B-88EF-82071CA11326}" dt="2021-10-15T19:53:06.178" v="1375" actId="26606"/>
+          <ac:cxnSpMkLst>
+            <pc:docMk/>
+            <pc:sldMk cId="3937668167" sldId="266"/>
+            <ac:cxnSpMk id="42" creationId="{514EE78B-AF71-4195-A01B-F1165D9233BF}"/>
+          </ac:cxnSpMkLst>
+        </pc:cxnChg>
+        <pc:cxnChg chg="add del">
+          <ac:chgData name="jack copeland" userId="c1f67f945e5b5c42" providerId="LiveId" clId="{61313348-D28B-4C2B-88EF-82071CA11326}" dt="2021-10-15T19:53:06.178" v="1375" actId="26606"/>
+          <ac:cxnSpMkLst>
+            <pc:docMk/>
+            <pc:sldMk cId="3937668167" sldId="266"/>
+            <ac:cxnSpMk id="45" creationId="{04733B62-1719-4677-A612-CA0AC0AD7482}"/>
+          </ac:cxnSpMkLst>
+        </pc:cxnChg>
+      </pc:sldChg>
+      <pc:sldChg chg="delSp modSp add mod">
+        <pc:chgData name="jack copeland" userId="c1f67f945e5b5c42" providerId="LiveId" clId="{61313348-D28B-4C2B-88EF-82071CA11326}" dt="2021-10-15T19:58:52.567" v="1760" actId="20577"/>
+        <pc:sldMkLst>
+          <pc:docMk/>
+          <pc:sldMk cId="4074031005" sldId="267"/>
+        </pc:sldMkLst>
+        <pc:spChg chg="mod">
+          <ac:chgData name="jack copeland" userId="c1f67f945e5b5c42" providerId="LiveId" clId="{61313348-D28B-4C2B-88EF-82071CA11326}" dt="2021-10-15T19:58:52.567" v="1760" actId="20577"/>
+          <ac:spMkLst>
+            <pc:docMk/>
+            <pc:sldMk cId="4074031005" sldId="267"/>
+            <ac:spMk id="5" creationId="{B2E9AF01-269C-41F1-AE19-40DA7D48E507}"/>
+          </ac:spMkLst>
+        </pc:spChg>
+        <pc:picChg chg="mod">
+          <ac:chgData name="jack copeland" userId="c1f67f945e5b5c42" providerId="LiveId" clId="{61313348-D28B-4C2B-88EF-82071CA11326}" dt="2021-10-15T19:57:57.294" v="1556" actId="14826"/>
+          <ac:picMkLst>
+            <pc:docMk/>
+            <pc:sldMk cId="4074031005" sldId="267"/>
+            <ac:picMk id="4" creationId="{5BF8F774-5544-44EE-A728-A59B0D471603}"/>
+          </ac:picMkLst>
+        </pc:picChg>
+        <pc:cxnChg chg="del">
+          <ac:chgData name="jack copeland" userId="c1f67f945e5b5c42" providerId="LiveId" clId="{61313348-D28B-4C2B-88EF-82071CA11326}" dt="2021-10-15T19:58:00.302" v="1557" actId="478"/>
+          <ac:cxnSpMkLst>
+            <pc:docMk/>
+            <pc:sldMk cId="4074031005" sldId="267"/>
+            <ac:cxnSpMk id="6" creationId="{7110F110-0206-4F8D-8B70-EEF84A281CF2}"/>
+          </ac:cxnSpMkLst>
+        </pc:cxnChg>
+      </pc:sldChg>
+      <pc:sldChg chg="addSp delSp modSp add mod setBg">
+        <pc:chgData name="jack copeland" userId="c1f67f945e5b5c42" providerId="LiveId" clId="{61313348-D28B-4C2B-88EF-82071CA11326}" dt="2021-10-15T20:02:09.486" v="1828" actId="20577"/>
+        <pc:sldMkLst>
+          <pc:docMk/>
+          <pc:sldMk cId="2398329897" sldId="268"/>
+        </pc:sldMkLst>
+        <pc:spChg chg="mod">
+          <ac:chgData name="jack copeland" userId="c1f67f945e5b5c42" providerId="LiveId" clId="{61313348-D28B-4C2B-88EF-82071CA11326}" dt="2021-10-15T20:01:10.436" v="1812" actId="1076"/>
+          <ac:spMkLst>
+            <pc:docMk/>
+            <pc:sldMk cId="2398329897" sldId="268"/>
+            <ac:spMk id="2" creationId="{92A9B60F-7F68-48F6-9FB9-2CF291C61653}"/>
+          </ac:spMkLst>
+        </pc:spChg>
+        <pc:spChg chg="add mod ord">
+          <ac:chgData name="jack copeland" userId="c1f67f945e5b5c42" providerId="LiveId" clId="{61313348-D28B-4C2B-88EF-82071CA11326}" dt="2021-10-15T20:01:42.441" v="1819" actId="167"/>
+          <ac:spMkLst>
+            <pc:docMk/>
+            <pc:sldMk cId="2398329897" sldId="268"/>
+            <ac:spMk id="5" creationId="{94338BE7-D0DC-4348-B863-E0C1E46E2508}"/>
+          </ac:spMkLst>
+        </pc:spChg>
+        <pc:spChg chg="add del">
+          <ac:chgData name="jack copeland" userId="c1f67f945e5b5c42" providerId="LiveId" clId="{61313348-D28B-4C2B-88EF-82071CA11326}" dt="2021-10-15T20:01:00.418" v="1807" actId="26606"/>
+          <ac:spMkLst>
+            <pc:docMk/>
+            <pc:sldMk cId="2398329897" sldId="268"/>
+            <ac:spMk id="9" creationId="{25C8D2C1-DA83-420D-9635-D52CE066B5DA}"/>
+          </ac:spMkLst>
+        </pc:spChg>
+        <pc:spChg chg="add del">
+          <ac:chgData name="jack copeland" userId="c1f67f945e5b5c42" providerId="LiveId" clId="{61313348-D28B-4C2B-88EF-82071CA11326}" dt="2021-10-15T20:01:00.418" v="1807" actId="26606"/>
+          <ac:spMkLst>
+            <pc:docMk/>
+            <pc:sldMk cId="2398329897" sldId="268"/>
+            <ac:spMk id="11" creationId="{434F74C9-6A0B-409E-AD1C-45B58BE91BB8}"/>
+          </ac:spMkLst>
+        </pc:spChg>
+        <pc:spChg chg="add del">
+          <ac:chgData name="jack copeland" userId="c1f67f945e5b5c42" providerId="LiveId" clId="{61313348-D28B-4C2B-88EF-82071CA11326}" dt="2021-10-15T20:01:00.418" v="1807" actId="26606"/>
+          <ac:spMkLst>
+            <pc:docMk/>
+            <pc:sldMk cId="2398329897" sldId="268"/>
+            <ac:spMk id="15" creationId="{90AA6468-80AC-4DDF-9CFB-C7A9507E203F}"/>
+          </ac:spMkLst>
+        </pc:spChg>
+        <pc:spChg chg="add del">
+          <ac:chgData name="jack copeland" userId="c1f67f945e5b5c42" providerId="LiveId" clId="{61313348-D28B-4C2B-88EF-82071CA11326}" dt="2021-10-15T20:01:00.418" v="1807" actId="26606"/>
+          <ac:spMkLst>
+            <pc:docMk/>
+            <pc:sldMk cId="2398329897" sldId="268"/>
+            <ac:spMk id="17" creationId="{4AB900CC-5074-4746-A1A4-AF640455BD43}"/>
+          </ac:spMkLst>
+        </pc:spChg>
+        <pc:spChg chg="add mod">
+          <ac:chgData name="jack copeland" userId="c1f67f945e5b5c42" providerId="LiveId" clId="{61313348-D28B-4C2B-88EF-82071CA11326}" dt="2021-10-15T20:02:09.486" v="1828" actId="20577"/>
+          <ac:spMkLst>
+            <pc:docMk/>
+            <pc:sldMk cId="2398329897" sldId="268"/>
+            <ac:spMk id="18" creationId="{D9EBEAEA-2A8A-40C4-8E55-39AB8DDC4052}"/>
+          </ac:spMkLst>
+        </pc:spChg>
+        <pc:spChg chg="del">
+          <ac:chgData name="jack copeland" userId="c1f67f945e5b5c42" providerId="LiveId" clId="{61313348-D28B-4C2B-88EF-82071CA11326}" dt="2021-10-15T20:00:36.150" v="1800" actId="478"/>
+          <ac:spMkLst>
+            <pc:docMk/>
+            <pc:sldMk cId="2398329897" sldId="268"/>
+            <ac:spMk id="39" creationId="{7DCC5B35-660B-48B1-B480-FE9EA1C104AC}"/>
+          </ac:spMkLst>
+        </pc:spChg>
+        <pc:spChg chg="del">
+          <ac:chgData name="jack copeland" userId="c1f67f945e5b5c42" providerId="LiveId" clId="{61313348-D28B-4C2B-88EF-82071CA11326}" dt="2021-10-15T20:00:36.150" v="1800" actId="478"/>
+          <ac:spMkLst>
+            <pc:docMk/>
+            <pc:sldMk cId="2398329897" sldId="268"/>
+            <ac:spMk id="49" creationId="{371C004D-6EFA-4601-9F34-A6BEA448D4FB}"/>
+          </ac:spMkLst>
+        </pc:spChg>
+        <pc:picChg chg="add mod">
+          <ac:chgData name="jack copeland" userId="c1f67f945e5b5c42" providerId="LiveId" clId="{61313348-D28B-4C2B-88EF-82071CA11326}" dt="2021-10-15T20:01:51.593" v="1823" actId="208"/>
+          <ac:picMkLst>
+            <pc:docMk/>
+            <pc:sldMk cId="2398329897" sldId="268"/>
+            <ac:picMk id="4" creationId="{44F94718-B425-42CB-AC4C-3B4E82CB53B7}"/>
+          </ac:picMkLst>
+        </pc:picChg>
+        <pc:picChg chg="del">
+          <ac:chgData name="jack copeland" userId="c1f67f945e5b5c42" providerId="LiveId" clId="{61313348-D28B-4C2B-88EF-82071CA11326}" dt="2021-10-15T20:00:34.078" v="1799" actId="478"/>
+          <ac:picMkLst>
+            <pc:docMk/>
+            <pc:sldMk cId="2398329897" sldId="268"/>
+            <ac:picMk id="7" creationId="{0EEEFFFE-362A-42AF-B2A2-FD58FAE57F09}"/>
+          </ac:picMkLst>
+        </pc:picChg>
+        <pc:picChg chg="del">
+          <ac:chgData name="jack copeland" userId="c1f67f945e5b5c42" providerId="LiveId" clId="{61313348-D28B-4C2B-88EF-82071CA11326}" dt="2021-10-15T20:00:34.078" v="1799" actId="478"/>
+          <ac:picMkLst>
+            <pc:docMk/>
+            <pc:sldMk cId="2398329897" sldId="268"/>
+            <ac:picMk id="48" creationId="{4F858A45-48DC-4EDC-8377-97E9A5ECD36B}"/>
+          </ac:picMkLst>
+        </pc:picChg>
+        <pc:cxnChg chg="add">
+          <ac:chgData name="jack copeland" userId="c1f67f945e5b5c42" providerId="LiveId" clId="{61313348-D28B-4C2B-88EF-82071CA11326}" dt="2021-10-15T20:01:37.288" v="1817" actId="11529"/>
+          <ac:cxnSpMkLst>
+            <pc:docMk/>
+            <pc:sldMk cId="2398329897" sldId="268"/>
+            <ac:cxnSpMk id="8" creationId="{759EAF15-9400-4679-BEE9-A871E43327B8}"/>
+          </ac:cxnSpMkLst>
+        </pc:cxnChg>
+        <pc:cxnChg chg="add del">
+          <ac:chgData name="jack copeland" userId="c1f67f945e5b5c42" providerId="LiveId" clId="{61313348-D28B-4C2B-88EF-82071CA11326}" dt="2021-10-15T20:01:00.418" v="1807" actId="26606"/>
+          <ac:cxnSpMkLst>
+            <pc:docMk/>
+            <pc:sldMk cId="2398329897" sldId="268"/>
+            <ac:cxnSpMk id="13" creationId="{F5486A9D-1265-4B57-91E6-68E666B978BC}"/>
+          </ac:cxnSpMkLst>
+        </pc:cxnChg>
       </pc:sldChg>
     </pc:docChg>
   </pc:docChgLst>
@@ -2736,7 +3246,7 @@
         <a:p>
           <a:r>
             <a:rPr lang="en-US" dirty="0"/>
-            <a:t>Research Question/Results</a:t>
+            <a:t>Research Question</a:t>
           </a:r>
         </a:p>
       </dgm:t>
@@ -3984,7 +4494,7 @@
           </a:pPr>
           <a:r>
             <a:rPr lang="en-US" sz="2600" kern="1200" dirty="0"/>
-            <a:t>Research Question/Results</a:t>
+            <a:t>Research Question</a:t>
           </a:r>
         </a:p>
       </dsp:txBody>
@@ -13055,6 +13565,342 @@
 </p:notesMaster>
 </file>
 
+<file path=ppt/notesSlides/notesSlide1.xml><?xml version="1.0" encoding="utf-8"?>
+<p:notes xmlns:a="http://schemas.openxmlformats.org/drawingml/2006/main" xmlns:r="http://schemas.openxmlformats.org/officeDocument/2006/relationships" xmlns:p="http://schemas.openxmlformats.org/presentationml/2006/main">
+  <p:cSld>
+    <p:spTree>
+      <p:nvGrpSpPr>
+        <p:cNvPr id="1" name=""/>
+        <p:cNvGrpSpPr/>
+        <p:nvPr/>
+      </p:nvGrpSpPr>
+      <p:grpSpPr>
+        <a:xfrm>
+          <a:off x="0" y="0"/>
+          <a:ext cx="0" cy="0"/>
+          <a:chOff x="0" y="0"/>
+          <a:chExt cx="0" cy="0"/>
+        </a:xfrm>
+      </p:grpSpPr>
+      <p:sp>
+        <p:nvSpPr>
+          <p:cNvPr id="2" name="Slide Image Placeholder 1"/>
+          <p:cNvSpPr>
+            <a:spLocks noGrp="1" noRot="1" noChangeAspect="1"/>
+          </p:cNvSpPr>
+          <p:nvPr>
+            <p:ph type="sldImg"/>
+          </p:nvPr>
+        </p:nvSpPr>
+        <p:spPr/>
+      </p:sp>
+      <p:sp>
+        <p:nvSpPr>
+          <p:cNvPr id="3" name="Notes Placeholder 2"/>
+          <p:cNvSpPr>
+            <a:spLocks noGrp="1"/>
+          </p:cNvSpPr>
+          <p:nvPr>
+            <p:ph type="body" idx="1"/>
+          </p:nvPr>
+        </p:nvSpPr>
+        <p:spPr/>
+        <p:txBody>
+          <a:bodyPr/>
+          <a:lstStyle/>
+          <a:p>
+            <a:endParaRPr lang="en-US" dirty="0"/>
+          </a:p>
+        </p:txBody>
+      </p:sp>
+      <p:sp>
+        <p:nvSpPr>
+          <p:cNvPr id="4" name="Slide Number Placeholder 3"/>
+          <p:cNvSpPr>
+            <a:spLocks noGrp="1"/>
+          </p:cNvSpPr>
+          <p:nvPr>
+            <p:ph type="sldNum" sz="quarter" idx="5"/>
+          </p:nvPr>
+        </p:nvSpPr>
+        <p:spPr/>
+        <p:txBody>
+          <a:bodyPr/>
+          <a:lstStyle/>
+          <a:p>
+            <a:fld id="{302C64B7-96AE-4C1F-AFF5-ACD431C321CF}" type="slidenum">
+              <a:rPr lang="en-US" smtClean="0"/>
+              <a:t>9</a:t>
+            </a:fld>
+            <a:endParaRPr lang="en-US"/>
+          </a:p>
+        </p:txBody>
+      </p:sp>
+    </p:spTree>
+    <p:extLst>
+      <p:ext uri="{BB962C8B-B14F-4D97-AF65-F5344CB8AC3E}">
+        <p14:creationId xmlns:p14="http://schemas.microsoft.com/office/powerpoint/2010/main" val="1038184211"/>
+      </p:ext>
+    </p:extLst>
+  </p:cSld>
+  <p:clrMapOvr>
+    <a:masterClrMapping/>
+  </p:clrMapOvr>
+</p:notes>
+</file>
+
+<file path=ppt/notesSlides/notesSlide2.xml><?xml version="1.0" encoding="utf-8"?>
+<p:notes xmlns:a="http://schemas.openxmlformats.org/drawingml/2006/main" xmlns:r="http://schemas.openxmlformats.org/officeDocument/2006/relationships" xmlns:p="http://schemas.openxmlformats.org/presentationml/2006/main">
+  <p:cSld>
+    <p:spTree>
+      <p:nvGrpSpPr>
+        <p:cNvPr id="1" name=""/>
+        <p:cNvGrpSpPr/>
+        <p:nvPr/>
+      </p:nvGrpSpPr>
+      <p:grpSpPr>
+        <a:xfrm>
+          <a:off x="0" y="0"/>
+          <a:ext cx="0" cy="0"/>
+          <a:chOff x="0" y="0"/>
+          <a:chExt cx="0" cy="0"/>
+        </a:xfrm>
+      </p:grpSpPr>
+      <p:sp>
+        <p:nvSpPr>
+          <p:cNvPr id="2" name="Slide Image Placeholder 1"/>
+          <p:cNvSpPr>
+            <a:spLocks noGrp="1" noRot="1" noChangeAspect="1"/>
+          </p:cNvSpPr>
+          <p:nvPr>
+            <p:ph type="sldImg"/>
+          </p:nvPr>
+        </p:nvSpPr>
+        <p:spPr/>
+      </p:sp>
+      <p:sp>
+        <p:nvSpPr>
+          <p:cNvPr id="3" name="Notes Placeholder 2"/>
+          <p:cNvSpPr>
+            <a:spLocks noGrp="1"/>
+          </p:cNvSpPr>
+          <p:nvPr>
+            <p:ph type="body" idx="1"/>
+          </p:nvPr>
+        </p:nvSpPr>
+        <p:spPr/>
+        <p:txBody>
+          <a:bodyPr/>
+          <a:lstStyle/>
+          <a:p>
+            <a:endParaRPr lang="en-US" dirty="0"/>
+          </a:p>
+        </p:txBody>
+      </p:sp>
+      <p:sp>
+        <p:nvSpPr>
+          <p:cNvPr id="4" name="Slide Number Placeholder 3"/>
+          <p:cNvSpPr>
+            <a:spLocks noGrp="1"/>
+          </p:cNvSpPr>
+          <p:nvPr>
+            <p:ph type="sldNum" sz="quarter" idx="5"/>
+          </p:nvPr>
+        </p:nvSpPr>
+        <p:spPr/>
+        <p:txBody>
+          <a:bodyPr/>
+          <a:lstStyle/>
+          <a:p>
+            <a:fld id="{302C64B7-96AE-4C1F-AFF5-ACD431C321CF}" type="slidenum">
+              <a:rPr lang="en-US" smtClean="0"/>
+              <a:t>10</a:t>
+            </a:fld>
+            <a:endParaRPr lang="en-US"/>
+          </a:p>
+        </p:txBody>
+      </p:sp>
+    </p:spTree>
+    <p:extLst>
+      <p:ext uri="{BB962C8B-B14F-4D97-AF65-F5344CB8AC3E}">
+        <p14:creationId xmlns:p14="http://schemas.microsoft.com/office/powerpoint/2010/main" val="3498044902"/>
+      </p:ext>
+    </p:extLst>
+  </p:cSld>
+  <p:clrMapOvr>
+    <a:masterClrMapping/>
+  </p:clrMapOvr>
+</p:notes>
+</file>
+
+<file path=ppt/notesSlides/notesSlide3.xml><?xml version="1.0" encoding="utf-8"?>
+<p:notes xmlns:a="http://schemas.openxmlformats.org/drawingml/2006/main" xmlns:r="http://schemas.openxmlformats.org/officeDocument/2006/relationships" xmlns:p="http://schemas.openxmlformats.org/presentationml/2006/main">
+  <p:cSld>
+    <p:spTree>
+      <p:nvGrpSpPr>
+        <p:cNvPr id="1" name=""/>
+        <p:cNvGrpSpPr/>
+        <p:nvPr/>
+      </p:nvGrpSpPr>
+      <p:grpSpPr>
+        <a:xfrm>
+          <a:off x="0" y="0"/>
+          <a:ext cx="0" cy="0"/>
+          <a:chOff x="0" y="0"/>
+          <a:chExt cx="0" cy="0"/>
+        </a:xfrm>
+      </p:grpSpPr>
+      <p:sp>
+        <p:nvSpPr>
+          <p:cNvPr id="2" name="Slide Image Placeholder 1"/>
+          <p:cNvSpPr>
+            <a:spLocks noGrp="1" noRot="1" noChangeAspect="1"/>
+          </p:cNvSpPr>
+          <p:nvPr>
+            <p:ph type="sldImg"/>
+          </p:nvPr>
+        </p:nvSpPr>
+        <p:spPr/>
+      </p:sp>
+      <p:sp>
+        <p:nvSpPr>
+          <p:cNvPr id="3" name="Notes Placeholder 2"/>
+          <p:cNvSpPr>
+            <a:spLocks noGrp="1"/>
+          </p:cNvSpPr>
+          <p:nvPr>
+            <p:ph type="body" idx="1"/>
+          </p:nvPr>
+        </p:nvSpPr>
+        <p:spPr/>
+        <p:txBody>
+          <a:bodyPr/>
+          <a:lstStyle/>
+          <a:p>
+            <a:endParaRPr lang="en-US" dirty="0"/>
+          </a:p>
+        </p:txBody>
+      </p:sp>
+      <p:sp>
+        <p:nvSpPr>
+          <p:cNvPr id="4" name="Slide Number Placeholder 3"/>
+          <p:cNvSpPr>
+            <a:spLocks noGrp="1"/>
+          </p:cNvSpPr>
+          <p:nvPr>
+            <p:ph type="sldNum" sz="quarter" idx="5"/>
+          </p:nvPr>
+        </p:nvSpPr>
+        <p:spPr/>
+        <p:txBody>
+          <a:bodyPr/>
+          <a:lstStyle/>
+          <a:p>
+            <a:fld id="{302C64B7-96AE-4C1F-AFF5-ACD431C321CF}" type="slidenum">
+              <a:rPr lang="en-US" smtClean="0"/>
+              <a:t>11</a:t>
+            </a:fld>
+            <a:endParaRPr lang="en-US"/>
+          </a:p>
+        </p:txBody>
+      </p:sp>
+    </p:spTree>
+    <p:extLst>
+      <p:ext uri="{BB962C8B-B14F-4D97-AF65-F5344CB8AC3E}">
+        <p14:creationId xmlns:p14="http://schemas.microsoft.com/office/powerpoint/2010/main" val="744852310"/>
+      </p:ext>
+    </p:extLst>
+  </p:cSld>
+  <p:clrMapOvr>
+    <a:masterClrMapping/>
+  </p:clrMapOvr>
+</p:notes>
+</file>
+
+<file path=ppt/notesSlides/notesSlide4.xml><?xml version="1.0" encoding="utf-8"?>
+<p:notes xmlns:a="http://schemas.openxmlformats.org/drawingml/2006/main" xmlns:r="http://schemas.openxmlformats.org/officeDocument/2006/relationships" xmlns:p="http://schemas.openxmlformats.org/presentationml/2006/main">
+  <p:cSld>
+    <p:spTree>
+      <p:nvGrpSpPr>
+        <p:cNvPr id="1" name=""/>
+        <p:cNvGrpSpPr/>
+        <p:nvPr/>
+      </p:nvGrpSpPr>
+      <p:grpSpPr>
+        <a:xfrm>
+          <a:off x="0" y="0"/>
+          <a:ext cx="0" cy="0"/>
+          <a:chOff x="0" y="0"/>
+          <a:chExt cx="0" cy="0"/>
+        </a:xfrm>
+      </p:grpSpPr>
+      <p:sp>
+        <p:nvSpPr>
+          <p:cNvPr id="2" name="Slide Image Placeholder 1"/>
+          <p:cNvSpPr>
+            <a:spLocks noGrp="1" noRot="1" noChangeAspect="1"/>
+          </p:cNvSpPr>
+          <p:nvPr>
+            <p:ph type="sldImg"/>
+          </p:nvPr>
+        </p:nvSpPr>
+        <p:spPr/>
+      </p:sp>
+      <p:sp>
+        <p:nvSpPr>
+          <p:cNvPr id="3" name="Notes Placeholder 2"/>
+          <p:cNvSpPr>
+            <a:spLocks noGrp="1"/>
+          </p:cNvSpPr>
+          <p:nvPr>
+            <p:ph type="body" idx="1"/>
+          </p:nvPr>
+        </p:nvSpPr>
+        <p:spPr/>
+        <p:txBody>
+          <a:bodyPr/>
+          <a:lstStyle/>
+          <a:p>
+            <a:endParaRPr lang="en-US" dirty="0"/>
+          </a:p>
+        </p:txBody>
+      </p:sp>
+      <p:sp>
+        <p:nvSpPr>
+          <p:cNvPr id="4" name="Slide Number Placeholder 3"/>
+          <p:cNvSpPr>
+            <a:spLocks noGrp="1"/>
+          </p:cNvSpPr>
+          <p:nvPr>
+            <p:ph type="sldNum" sz="quarter" idx="5"/>
+          </p:nvPr>
+        </p:nvSpPr>
+        <p:spPr/>
+        <p:txBody>
+          <a:bodyPr/>
+          <a:lstStyle/>
+          <a:p>
+            <a:fld id="{302C64B7-96AE-4C1F-AFF5-ACD431C321CF}" type="slidenum">
+              <a:rPr lang="en-US" smtClean="0"/>
+              <a:t>12</a:t>
+            </a:fld>
+            <a:endParaRPr lang="en-US"/>
+          </a:p>
+        </p:txBody>
+      </p:sp>
+    </p:spTree>
+    <p:extLst>
+      <p:ext uri="{BB962C8B-B14F-4D97-AF65-F5344CB8AC3E}">
+        <p14:creationId xmlns:p14="http://schemas.microsoft.com/office/powerpoint/2010/main" val="2495858463"/>
+      </p:ext>
+    </p:extLst>
+  </p:cSld>
+  <p:clrMapOvr>
+    <a:masterClrMapping/>
+  </p:clrMapOvr>
+</p:notes>
+</file>
+
 <file path=ppt/slideLayouts/slideLayout1.xml><?xml version="1.0" encoding="utf-8"?>
 <p:sldLayout xmlns:a="http://schemas.openxmlformats.org/drawingml/2006/main" xmlns:r="http://schemas.openxmlformats.org/officeDocument/2006/relationships" xmlns:p="http://schemas.openxmlformats.org/presentationml/2006/main" showMasterSp="0" type="title" preserve="1">
   <p:cSld name="Title Slide">
@@ -16893,6 +17739,722 @@
 </p:sld>
 </file>
 
+<file path=ppt/slides/slide10.xml><?xml version="1.0" encoding="utf-8"?>
+<p:sld xmlns:a="http://schemas.openxmlformats.org/drawingml/2006/main" xmlns:r="http://schemas.openxmlformats.org/officeDocument/2006/relationships" xmlns:p="http://schemas.openxmlformats.org/presentationml/2006/main">
+  <p:cSld>
+    <p:spTree>
+      <p:nvGrpSpPr>
+        <p:cNvPr id="1" name=""/>
+        <p:cNvGrpSpPr/>
+        <p:nvPr/>
+      </p:nvGrpSpPr>
+      <p:grpSpPr>
+        <a:xfrm>
+          <a:off x="0" y="0"/>
+          <a:ext cx="0" cy="0"/>
+          <a:chOff x="0" y="0"/>
+          <a:chExt cx="0" cy="0"/>
+        </a:xfrm>
+      </p:grpSpPr>
+      <p:sp>
+        <p:nvSpPr>
+          <p:cNvPr id="2" name="Title 1">
+            <a:extLst>
+              <a:ext uri="{FF2B5EF4-FFF2-40B4-BE49-F238E27FC236}">
+                <a16:creationId xmlns:a16="http://schemas.microsoft.com/office/drawing/2014/main" id="{92A9B60F-7F68-48F6-9FB9-2CF291C61653}"/>
+              </a:ext>
+            </a:extLst>
+          </p:cNvPr>
+          <p:cNvSpPr>
+            <a:spLocks noGrp="1"/>
+          </p:cNvSpPr>
+          <p:nvPr>
+            <p:ph type="title"/>
+          </p:nvPr>
+        </p:nvSpPr>
+        <p:spPr/>
+        <p:txBody>
+          <a:bodyPr/>
+          <a:lstStyle/>
+          <a:p>
+            <a:r>
+              <a:rPr lang="en-US" dirty="0"/>
+              <a:t>Street Easy Rent Data </a:t>
+            </a:r>
+          </a:p>
+        </p:txBody>
+      </p:sp>
+      <p:pic>
+        <p:nvPicPr>
+          <p:cNvPr id="4" name="Picture 3">
+            <a:extLst>
+              <a:ext uri="{FF2B5EF4-FFF2-40B4-BE49-F238E27FC236}">
+                <a16:creationId xmlns:a16="http://schemas.microsoft.com/office/drawing/2014/main" id="{5BF8F774-5544-44EE-A728-A59B0D471603}"/>
+              </a:ext>
+            </a:extLst>
+          </p:cNvPr>
+          <p:cNvPicPr>
+            <a:picLocks noChangeAspect="1"/>
+          </p:cNvPicPr>
+          <p:nvPr/>
+        </p:nvPicPr>
+        <p:blipFill>
+          <a:blip r:embed="rId3">
+            <a:extLst>
+              <a:ext uri="{28A0092B-C50C-407E-A947-70E740481C1C}">
+                <a14:useLocalDpi xmlns:a14="http://schemas.microsoft.com/office/drawing/2010/main" val="0"/>
+              </a:ext>
+            </a:extLst>
+          </a:blip>
+          <a:srcRect/>
+          <a:stretch/>
+        </p:blipFill>
+        <p:spPr>
+          <a:xfrm>
+            <a:off x="1163956" y="1844332"/>
+            <a:ext cx="8065768" cy="4324472"/>
+          </a:xfrm>
+          <a:prstGeom prst="rect">
+            <a:avLst/>
+          </a:prstGeom>
+          <a:ln>
+            <a:solidFill>
+              <a:schemeClr val="tx1"/>
+            </a:solidFill>
+          </a:ln>
+        </p:spPr>
+      </p:pic>
+      <p:sp>
+        <p:nvSpPr>
+          <p:cNvPr id="5" name="Rectangle 4">
+            <a:extLst>
+              <a:ext uri="{FF2B5EF4-FFF2-40B4-BE49-F238E27FC236}">
+                <a16:creationId xmlns:a16="http://schemas.microsoft.com/office/drawing/2014/main" id="{B2E9AF01-269C-41F1-AE19-40DA7D48E507}"/>
+              </a:ext>
+            </a:extLst>
+          </p:cNvPr>
+          <p:cNvSpPr/>
+          <p:nvPr/>
+        </p:nvSpPr>
+        <p:spPr>
+          <a:xfrm>
+            <a:off x="9401175" y="1844332"/>
+            <a:ext cx="2667000" cy="4324473"/>
+          </a:xfrm>
+          <a:prstGeom prst="rect">
+            <a:avLst/>
+          </a:prstGeom>
+          <a:solidFill>
+            <a:schemeClr val="bg1"/>
+          </a:solidFill>
+          <a:ln w="12700"/>
+        </p:spPr>
+        <p:style>
+          <a:lnRef idx="2">
+            <a:schemeClr val="accent1">
+              <a:shade val="50000"/>
+            </a:schemeClr>
+          </a:lnRef>
+          <a:fillRef idx="1">
+            <a:schemeClr val="accent1"/>
+          </a:fillRef>
+          <a:effectRef idx="0">
+            <a:schemeClr val="accent1"/>
+          </a:effectRef>
+          <a:fontRef idx="minor">
+            <a:schemeClr val="lt1"/>
+          </a:fontRef>
+        </p:style>
+        <p:txBody>
+          <a:bodyPr rtlCol="0" anchor="t"/>
+          <a:lstStyle/>
+          <a:p>
+            <a:r>
+              <a:rPr lang="en-US" b="1" dirty="0">
+                <a:solidFill>
+                  <a:schemeClr val="tx1"/>
+                </a:solidFill>
+              </a:rPr>
+              <a:t>Key Takeaways:</a:t>
+            </a:r>
+          </a:p>
+          <a:p>
+            <a:endParaRPr lang="en-US" sz="1600" b="1" dirty="0">
+              <a:solidFill>
+                <a:schemeClr val="tx1"/>
+              </a:solidFill>
+            </a:endParaRPr>
+          </a:p>
+          <a:p>
+            <a:pPr marL="285750" indent="-285750">
+              <a:buFontTx/>
+              <a:buChar char="-"/>
+            </a:pPr>
+            <a:r>
+              <a:rPr lang="en-US" sz="1600" dirty="0">
+                <a:solidFill>
+                  <a:schemeClr val="tx1"/>
+                </a:solidFill>
+              </a:rPr>
+              <a:t>Rents dropped significantly in Brooklyn and Manhattan </a:t>
+            </a:r>
+          </a:p>
+          <a:p>
+            <a:pPr marL="285750" indent="-285750">
+              <a:buFontTx/>
+              <a:buChar char="-"/>
+            </a:pPr>
+            <a:r>
+              <a:rPr lang="en-US" sz="1600" dirty="0">
+                <a:solidFill>
+                  <a:schemeClr val="tx1"/>
+                </a:solidFill>
+              </a:rPr>
+              <a:t>The other three boroughs only saw a slight decrease in rent </a:t>
+            </a:r>
+          </a:p>
+          <a:p>
+            <a:pPr marL="285750" indent="-285750">
+              <a:buFontTx/>
+              <a:buChar char="-"/>
+            </a:pPr>
+            <a:r>
+              <a:rPr lang="en-US" sz="1600" dirty="0">
+                <a:solidFill>
+                  <a:schemeClr val="tx1"/>
+                </a:solidFill>
+              </a:rPr>
+              <a:t>Currently, most boroughs have completely recovered to pre-covid rents</a:t>
+            </a:r>
+          </a:p>
+          <a:p>
+            <a:endParaRPr lang="en-US" sz="1600" dirty="0">
+              <a:solidFill>
+                <a:schemeClr val="tx1"/>
+              </a:solidFill>
+            </a:endParaRPr>
+          </a:p>
+          <a:p>
+            <a:pPr marL="285750" indent="-285750">
+              <a:buFontTx/>
+              <a:buChar char="-"/>
+            </a:pPr>
+            <a:endParaRPr lang="en-US" dirty="0">
+              <a:solidFill>
+                <a:schemeClr val="tx1"/>
+              </a:solidFill>
+            </a:endParaRPr>
+          </a:p>
+        </p:txBody>
+      </p:sp>
+    </p:spTree>
+    <p:extLst>
+      <p:ext uri="{BB962C8B-B14F-4D97-AF65-F5344CB8AC3E}">
+        <p14:creationId xmlns:p14="http://schemas.microsoft.com/office/powerpoint/2010/main" val="4074031005"/>
+      </p:ext>
+    </p:extLst>
+  </p:cSld>
+  <p:clrMapOvr>
+    <a:masterClrMapping/>
+  </p:clrMapOvr>
+</p:sld>
+</file>
+
+<file path=ppt/slides/slide11.xml><?xml version="1.0" encoding="utf-8"?>
+<p:sld xmlns:a="http://schemas.openxmlformats.org/drawingml/2006/main" xmlns:r="http://schemas.openxmlformats.org/officeDocument/2006/relationships" xmlns:p="http://schemas.openxmlformats.org/presentationml/2006/main">
+  <p:cSld>
+    <p:spTree>
+      <p:nvGrpSpPr>
+        <p:cNvPr id="1" name=""/>
+        <p:cNvGrpSpPr/>
+        <p:nvPr/>
+      </p:nvGrpSpPr>
+      <p:grpSpPr>
+        <a:xfrm>
+          <a:off x="0" y="0"/>
+          <a:ext cx="0" cy="0"/>
+          <a:chOff x="0" y="0"/>
+          <a:chExt cx="0" cy="0"/>
+        </a:xfrm>
+      </p:grpSpPr>
+      <p:sp>
+        <p:nvSpPr>
+          <p:cNvPr id="2" name="Title 1">
+            <a:extLst>
+              <a:ext uri="{FF2B5EF4-FFF2-40B4-BE49-F238E27FC236}">
+                <a16:creationId xmlns:a16="http://schemas.microsoft.com/office/drawing/2014/main" id="{92A9B60F-7F68-48F6-9FB9-2CF291C61653}"/>
+              </a:ext>
+            </a:extLst>
+          </p:cNvPr>
+          <p:cNvSpPr>
+            <a:spLocks noGrp="1"/>
+          </p:cNvSpPr>
+          <p:nvPr>
+            <p:ph type="title"/>
+          </p:nvPr>
+        </p:nvSpPr>
+        <p:spPr/>
+        <p:txBody>
+          <a:bodyPr/>
+          <a:lstStyle/>
+          <a:p>
+            <a:r>
+              <a:rPr lang="en-US"/>
+              <a:t>Street Easy Rent Data </a:t>
+            </a:r>
+            <a:endParaRPr lang="en-US" dirty="0"/>
+          </a:p>
+        </p:txBody>
+      </p:sp>
+      <p:pic>
+        <p:nvPicPr>
+          <p:cNvPr id="7" name="Picture 6" descr="Chart, waterfall chart&#10;&#10;Description automatically generated">
+            <a:extLst>
+              <a:ext uri="{FF2B5EF4-FFF2-40B4-BE49-F238E27FC236}">
+                <a16:creationId xmlns:a16="http://schemas.microsoft.com/office/drawing/2014/main" id="{0EEEFFFE-362A-42AF-B2A2-FD58FAE57F09}"/>
+              </a:ext>
+            </a:extLst>
+          </p:cNvPr>
+          <p:cNvPicPr>
+            <a:picLocks/>
+          </p:cNvPicPr>
+          <p:nvPr/>
+        </p:nvPicPr>
+        <p:blipFill>
+          <a:blip r:embed="rId3">
+            <a:extLst>
+              <a:ext uri="{28A0092B-C50C-407E-A947-70E740481C1C}">
+                <a14:useLocalDpi xmlns:a14="http://schemas.microsoft.com/office/drawing/2010/main" val="0"/>
+              </a:ext>
+            </a:extLst>
+          </a:blip>
+          <a:stretch>
+            <a:fillRect/>
+          </a:stretch>
+        </p:blipFill>
+        <p:spPr>
+          <a:xfrm>
+            <a:off x="312441" y="2439888"/>
+            <a:ext cx="5486400" cy="3547872"/>
+          </a:xfrm>
+          <a:prstGeom prst="rect">
+            <a:avLst/>
+          </a:prstGeom>
+          <a:ln>
+            <a:solidFill>
+              <a:schemeClr val="tx1"/>
+            </a:solidFill>
+          </a:ln>
+        </p:spPr>
+      </p:pic>
+      <p:sp>
+        <p:nvSpPr>
+          <p:cNvPr id="39" name="TextBox 38">
+            <a:extLst>
+              <a:ext uri="{FF2B5EF4-FFF2-40B4-BE49-F238E27FC236}">
+                <a16:creationId xmlns:a16="http://schemas.microsoft.com/office/drawing/2014/main" id="{7DCC5B35-660B-48B1-B480-FE9EA1C104AC}"/>
+              </a:ext>
+            </a:extLst>
+          </p:cNvPr>
+          <p:cNvSpPr txBox="1"/>
+          <p:nvPr/>
+        </p:nvSpPr>
+        <p:spPr>
+          <a:xfrm>
+            <a:off x="1232556" y="1793557"/>
+            <a:ext cx="3646170" cy="646331"/>
+          </a:xfrm>
+          <a:prstGeom prst="rect">
+            <a:avLst/>
+          </a:prstGeom>
+          <a:noFill/>
+        </p:spPr>
+        <p:txBody>
+          <a:bodyPr wrap="square" rtlCol="0">
+            <a:spAutoFit/>
+          </a:bodyPr>
+          <a:lstStyle/>
+          <a:p>
+            <a:pPr algn="ctr"/>
+            <a:r>
+              <a:rPr lang="en-US" dirty="0"/>
+              <a:t>Percent Change in Rent by Borough (Peak Covid vs. Pre Covid)</a:t>
+            </a:r>
+          </a:p>
+        </p:txBody>
+      </p:sp>
+      <p:pic>
+        <p:nvPicPr>
+          <p:cNvPr id="48" name="Picture 47">
+            <a:extLst>
+              <a:ext uri="{FF2B5EF4-FFF2-40B4-BE49-F238E27FC236}">
+                <a16:creationId xmlns:a16="http://schemas.microsoft.com/office/drawing/2014/main" id="{4F858A45-48DC-4EDC-8377-97E9A5ECD36B}"/>
+              </a:ext>
+            </a:extLst>
+          </p:cNvPr>
+          <p:cNvPicPr>
+            <a:picLocks/>
+          </p:cNvPicPr>
+          <p:nvPr/>
+        </p:nvPicPr>
+        <p:blipFill>
+          <a:blip r:embed="rId4">
+            <a:extLst>
+              <a:ext uri="{28A0092B-C50C-407E-A947-70E740481C1C}">
+                <a14:useLocalDpi xmlns:a14="http://schemas.microsoft.com/office/drawing/2010/main" val="0"/>
+              </a:ext>
+            </a:extLst>
+          </a:blip>
+          <a:srcRect/>
+          <a:stretch/>
+        </p:blipFill>
+        <p:spPr>
+          <a:xfrm>
+            <a:off x="6478884" y="2426553"/>
+            <a:ext cx="5486400" cy="3547871"/>
+          </a:xfrm>
+          <a:prstGeom prst="rect">
+            <a:avLst/>
+          </a:prstGeom>
+          <a:ln>
+            <a:solidFill>
+              <a:schemeClr val="tx1"/>
+            </a:solidFill>
+          </a:ln>
+        </p:spPr>
+      </p:pic>
+      <p:sp>
+        <p:nvSpPr>
+          <p:cNvPr id="49" name="TextBox 48">
+            <a:extLst>
+              <a:ext uri="{FF2B5EF4-FFF2-40B4-BE49-F238E27FC236}">
+                <a16:creationId xmlns:a16="http://schemas.microsoft.com/office/drawing/2014/main" id="{371C004D-6EFA-4601-9F34-A6BEA448D4FB}"/>
+              </a:ext>
+            </a:extLst>
+          </p:cNvPr>
+          <p:cNvSpPr txBox="1"/>
+          <p:nvPr/>
+        </p:nvSpPr>
+        <p:spPr>
+          <a:xfrm>
+            <a:off x="7398999" y="1780222"/>
+            <a:ext cx="3646170" cy="646331"/>
+          </a:xfrm>
+          <a:prstGeom prst="rect">
+            <a:avLst/>
+          </a:prstGeom>
+          <a:noFill/>
+        </p:spPr>
+        <p:txBody>
+          <a:bodyPr wrap="square" rtlCol="0">
+            <a:spAutoFit/>
+          </a:bodyPr>
+          <a:lstStyle/>
+          <a:p>
+            <a:pPr algn="ctr"/>
+            <a:r>
+              <a:rPr lang="en-US" dirty="0"/>
+              <a:t>Percent Change in Rent by Borough (Current rates vs. Pre-Covid)</a:t>
+            </a:r>
+          </a:p>
+        </p:txBody>
+      </p:sp>
+    </p:spTree>
+    <p:extLst>
+      <p:ext uri="{BB962C8B-B14F-4D97-AF65-F5344CB8AC3E}">
+        <p14:creationId xmlns:p14="http://schemas.microsoft.com/office/powerpoint/2010/main" val="3937668167"/>
+      </p:ext>
+    </p:extLst>
+  </p:cSld>
+  <p:clrMapOvr>
+    <a:masterClrMapping/>
+  </p:clrMapOvr>
+</p:sld>
+</file>
+
+<file path=ppt/slides/slide12.xml><?xml version="1.0" encoding="utf-8"?>
+<p:sld xmlns:a="http://schemas.openxmlformats.org/drawingml/2006/main" xmlns:r="http://schemas.openxmlformats.org/officeDocument/2006/relationships" xmlns:p="http://schemas.openxmlformats.org/presentationml/2006/main">
+  <p:cSld>
+    <p:spTree>
+      <p:nvGrpSpPr>
+        <p:cNvPr id="1" name=""/>
+        <p:cNvGrpSpPr/>
+        <p:nvPr/>
+      </p:nvGrpSpPr>
+      <p:grpSpPr>
+        <a:xfrm>
+          <a:off x="0" y="0"/>
+          <a:ext cx="0" cy="0"/>
+          <a:chOff x="0" y="0"/>
+          <a:chExt cx="0" cy="0"/>
+        </a:xfrm>
+      </p:grpSpPr>
+      <p:sp>
+        <p:nvSpPr>
+          <p:cNvPr id="5" name="Rectangle 4">
+            <a:extLst>
+              <a:ext uri="{FF2B5EF4-FFF2-40B4-BE49-F238E27FC236}">
+                <a16:creationId xmlns:a16="http://schemas.microsoft.com/office/drawing/2014/main" id="{94338BE7-D0DC-4348-B863-E0C1E46E2508}"/>
+              </a:ext>
+            </a:extLst>
+          </p:cNvPr>
+          <p:cNvSpPr/>
+          <p:nvPr/>
+        </p:nvSpPr>
+        <p:spPr>
+          <a:xfrm>
+            <a:off x="971550" y="1543050"/>
+            <a:ext cx="10401300" cy="257175"/>
+          </a:xfrm>
+          <a:prstGeom prst="rect">
+            <a:avLst/>
+          </a:prstGeom>
+          <a:solidFill>
+            <a:schemeClr val="bg1"/>
+          </a:solidFill>
+          <a:ln>
+            <a:solidFill>
+              <a:schemeClr val="bg1"/>
+            </a:solidFill>
+          </a:ln>
+        </p:spPr>
+        <p:style>
+          <a:lnRef idx="2">
+            <a:schemeClr val="accent1">
+              <a:shade val="50000"/>
+            </a:schemeClr>
+          </a:lnRef>
+          <a:fillRef idx="1">
+            <a:schemeClr val="accent1"/>
+          </a:fillRef>
+          <a:effectRef idx="0">
+            <a:schemeClr val="accent1"/>
+          </a:effectRef>
+          <a:fontRef idx="minor">
+            <a:schemeClr val="lt1"/>
+          </a:fontRef>
+        </p:style>
+        <p:txBody>
+          <a:bodyPr rtlCol="0" anchor="ctr"/>
+          <a:lstStyle/>
+          <a:p>
+            <a:pPr algn="ctr"/>
+            <a:endParaRPr lang="en-US">
+              <a:ln>
+                <a:solidFill>
+                  <a:schemeClr val="bg1"/>
+                </a:solidFill>
+              </a:ln>
+            </a:endParaRPr>
+          </a:p>
+        </p:txBody>
+      </p:sp>
+      <p:sp>
+        <p:nvSpPr>
+          <p:cNvPr id="2" name="Title 1">
+            <a:extLst>
+              <a:ext uri="{FF2B5EF4-FFF2-40B4-BE49-F238E27FC236}">
+                <a16:creationId xmlns:a16="http://schemas.microsoft.com/office/drawing/2014/main" id="{92A9B60F-7F68-48F6-9FB9-2CF291C61653}"/>
+              </a:ext>
+            </a:extLst>
+          </p:cNvPr>
+          <p:cNvSpPr>
+            <a:spLocks noGrp="1"/>
+          </p:cNvSpPr>
+          <p:nvPr>
+            <p:ph type="title"/>
+          </p:nvPr>
+        </p:nvSpPr>
+        <p:spPr>
+          <a:xfrm>
+            <a:off x="1066800" y="329039"/>
+            <a:ext cx="10058400" cy="580172"/>
+          </a:xfrm>
+        </p:spPr>
+        <p:txBody>
+          <a:bodyPr>
+            <a:normAutofit fontScale="90000"/>
+          </a:bodyPr>
+          <a:lstStyle/>
+          <a:p>
+            <a:r>
+              <a:rPr lang="en-US" dirty="0"/>
+              <a:t>Factors affecting changes</a:t>
+            </a:r>
+          </a:p>
+        </p:txBody>
+      </p:sp>
+      <p:pic>
+        <p:nvPicPr>
+          <p:cNvPr id="4" name="Picture 3" descr="A picture containing chart&#10;&#10;Description automatically generated">
+            <a:extLst>
+              <a:ext uri="{FF2B5EF4-FFF2-40B4-BE49-F238E27FC236}">
+                <a16:creationId xmlns:a16="http://schemas.microsoft.com/office/drawing/2014/main" id="{44F94718-B425-42CB-AC4C-3B4E82CB53B7}"/>
+              </a:ext>
+            </a:extLst>
+          </p:cNvPr>
+          <p:cNvPicPr>
+            <a:picLocks noChangeAspect="1"/>
+          </p:cNvPicPr>
+          <p:nvPr/>
+        </p:nvPicPr>
+        <p:blipFill>
+          <a:blip r:embed="rId3">
+            <a:extLst>
+              <a:ext uri="{28A0092B-C50C-407E-A947-70E740481C1C}">
+                <a14:useLocalDpi xmlns:a14="http://schemas.microsoft.com/office/drawing/2010/main" val="0"/>
+              </a:ext>
+            </a:extLst>
+          </a:blip>
+          <a:stretch>
+            <a:fillRect/>
+          </a:stretch>
+        </p:blipFill>
+        <p:spPr>
+          <a:xfrm>
+            <a:off x="1066800" y="1085849"/>
+            <a:ext cx="7505552" cy="5057769"/>
+          </a:xfrm>
+          <a:prstGeom prst="rect">
+            <a:avLst/>
+          </a:prstGeom>
+          <a:ln>
+            <a:solidFill>
+              <a:schemeClr val="tx1"/>
+            </a:solidFill>
+          </a:ln>
+        </p:spPr>
+      </p:pic>
+      <p:cxnSp>
+        <p:nvCxnSpPr>
+          <p:cNvPr id="8" name="Straight Connector 7">
+            <a:extLst>
+              <a:ext uri="{FF2B5EF4-FFF2-40B4-BE49-F238E27FC236}">
+                <a16:creationId xmlns:a16="http://schemas.microsoft.com/office/drawing/2014/main" id="{759EAF15-9400-4679-BEE9-A871E43327B8}"/>
+              </a:ext>
+            </a:extLst>
+          </p:cNvPr>
+          <p:cNvCxnSpPr/>
+          <p:nvPr/>
+        </p:nvCxnSpPr>
+        <p:spPr>
+          <a:xfrm>
+            <a:off x="971550" y="909211"/>
+            <a:ext cx="10477500" cy="0"/>
+          </a:xfrm>
+          <a:prstGeom prst="line">
+            <a:avLst/>
+          </a:prstGeom>
+        </p:spPr>
+        <p:style>
+          <a:lnRef idx="1">
+            <a:schemeClr val="accent1"/>
+          </a:lnRef>
+          <a:fillRef idx="0">
+            <a:schemeClr val="accent1"/>
+          </a:fillRef>
+          <a:effectRef idx="0">
+            <a:schemeClr val="accent1"/>
+          </a:effectRef>
+          <a:fontRef idx="minor">
+            <a:schemeClr val="tx1"/>
+          </a:fontRef>
+        </p:style>
+      </p:cxnSp>
+      <p:sp>
+        <p:nvSpPr>
+          <p:cNvPr id="18" name="Rectangle 17">
+            <a:extLst>
+              <a:ext uri="{FF2B5EF4-FFF2-40B4-BE49-F238E27FC236}">
+                <a16:creationId xmlns:a16="http://schemas.microsoft.com/office/drawing/2014/main" id="{D9EBEAEA-2A8A-40C4-8E55-39AB8DDC4052}"/>
+              </a:ext>
+            </a:extLst>
+          </p:cNvPr>
+          <p:cNvSpPr/>
+          <p:nvPr/>
+        </p:nvSpPr>
+        <p:spPr>
+          <a:xfrm>
+            <a:off x="8705850" y="1085849"/>
+            <a:ext cx="3067050" cy="5057767"/>
+          </a:xfrm>
+          <a:prstGeom prst="rect">
+            <a:avLst/>
+          </a:prstGeom>
+          <a:solidFill>
+            <a:schemeClr val="bg1"/>
+          </a:solidFill>
+          <a:ln w="12700"/>
+        </p:spPr>
+        <p:style>
+          <a:lnRef idx="2">
+            <a:schemeClr val="accent1">
+              <a:shade val="50000"/>
+            </a:schemeClr>
+          </a:lnRef>
+          <a:fillRef idx="1">
+            <a:schemeClr val="accent1"/>
+          </a:fillRef>
+          <a:effectRef idx="0">
+            <a:schemeClr val="accent1"/>
+          </a:effectRef>
+          <a:fontRef idx="minor">
+            <a:schemeClr val="lt1"/>
+          </a:fontRef>
+        </p:style>
+        <p:txBody>
+          <a:bodyPr rtlCol="0" anchor="t"/>
+          <a:lstStyle/>
+          <a:p>
+            <a:r>
+              <a:rPr lang="en-US" b="1" dirty="0">
+                <a:solidFill>
+                  <a:schemeClr val="tx1"/>
+                </a:solidFill>
+              </a:rPr>
+              <a:t>Key Takeaways:</a:t>
+            </a:r>
+          </a:p>
+          <a:p>
+            <a:endParaRPr lang="en-US" sz="1600" b="1" dirty="0">
+              <a:solidFill>
+                <a:schemeClr val="tx1"/>
+              </a:solidFill>
+            </a:endParaRPr>
+          </a:p>
+          <a:p>
+            <a:endParaRPr lang="en-US" sz="1600" dirty="0">
+              <a:solidFill>
+                <a:schemeClr val="tx1"/>
+              </a:solidFill>
+            </a:endParaRPr>
+          </a:p>
+          <a:p>
+            <a:pPr marL="285750" indent="-285750">
+              <a:buFontTx/>
+              <a:buChar char="-"/>
+            </a:pPr>
+            <a:endParaRPr lang="en-US" dirty="0">
+              <a:solidFill>
+                <a:schemeClr val="tx1"/>
+              </a:solidFill>
+            </a:endParaRPr>
+          </a:p>
+        </p:txBody>
+      </p:sp>
+    </p:spTree>
+    <p:extLst>
+      <p:ext uri="{BB962C8B-B14F-4D97-AF65-F5344CB8AC3E}">
+        <p14:creationId xmlns:p14="http://schemas.microsoft.com/office/powerpoint/2010/main" val="2398329897"/>
+      </p:ext>
+    </p:extLst>
+  </p:cSld>
+  <p:clrMapOvr>
+    <a:masterClrMapping/>
+  </p:clrMapOvr>
+</p:sld>
+</file>
+
 <file path=ppt/slides/slide2.xml><?xml version="1.0" encoding="utf-8"?>
 <p:sld xmlns:a="http://schemas.openxmlformats.org/drawingml/2006/main" xmlns:r="http://schemas.openxmlformats.org/officeDocument/2006/relationships" xmlns:p="http://schemas.openxmlformats.org/presentationml/2006/main">
   <p:cSld>
@@ -16954,7 +18516,7 @@
             <p:ph idx="1"/>
             <p:extLst>
               <p:ext uri="{D42A27DB-BD31-4B8C-83A1-F6EECF244321}">
-                <p14:modId xmlns:p14="http://schemas.microsoft.com/office/powerpoint/2010/main" val="2042215995"/>
+                <p14:modId xmlns:p14="http://schemas.microsoft.com/office/powerpoint/2010/main" val="4291507767"/>
               </p:ext>
             </p:extLst>
           </p:nvPr>
@@ -19339,10 +20901,431 @@
           </a:p>
         </p:txBody>
       </p:sp>
+      <p:pic>
+        <p:nvPicPr>
+          <p:cNvPr id="4" name="Picture 3" descr="Chart, histogram&#10;&#10;Description automatically generated">
+            <a:extLst>
+              <a:ext uri="{FF2B5EF4-FFF2-40B4-BE49-F238E27FC236}">
+                <a16:creationId xmlns:a16="http://schemas.microsoft.com/office/drawing/2014/main" id="{5BF8F774-5544-44EE-A728-A59B0D471603}"/>
+              </a:ext>
+            </a:extLst>
+          </p:cNvPr>
+          <p:cNvPicPr>
+            <a:picLocks noChangeAspect="1"/>
+          </p:cNvPicPr>
+          <p:nvPr/>
+        </p:nvPicPr>
+        <p:blipFill>
+          <a:blip r:embed="rId2">
+            <a:extLst>
+              <a:ext uri="{28A0092B-C50C-407E-A947-70E740481C1C}">
+                <a14:useLocalDpi xmlns:a14="http://schemas.microsoft.com/office/drawing/2010/main" val="0"/>
+              </a:ext>
+            </a:extLst>
+          </a:blip>
+          <a:stretch>
+            <a:fillRect/>
+          </a:stretch>
+        </p:blipFill>
+        <p:spPr>
+          <a:xfrm>
+            <a:off x="1163955" y="1844332"/>
+            <a:ext cx="8065770" cy="4324473"/>
+          </a:xfrm>
+          <a:prstGeom prst="rect">
+            <a:avLst/>
+          </a:prstGeom>
+          <a:ln>
+            <a:solidFill>
+              <a:schemeClr val="tx1"/>
+            </a:solidFill>
+          </a:ln>
+        </p:spPr>
+      </p:pic>
+      <p:sp>
+        <p:nvSpPr>
+          <p:cNvPr id="5" name="Rectangle 4">
+            <a:extLst>
+              <a:ext uri="{FF2B5EF4-FFF2-40B4-BE49-F238E27FC236}">
+                <a16:creationId xmlns:a16="http://schemas.microsoft.com/office/drawing/2014/main" id="{B2E9AF01-269C-41F1-AE19-40DA7D48E507}"/>
+              </a:ext>
+            </a:extLst>
+          </p:cNvPr>
+          <p:cNvSpPr/>
+          <p:nvPr/>
+        </p:nvSpPr>
+        <p:spPr>
+          <a:xfrm>
+            <a:off x="9401175" y="1844332"/>
+            <a:ext cx="2667000" cy="4324473"/>
+          </a:xfrm>
+          <a:prstGeom prst="rect">
+            <a:avLst/>
+          </a:prstGeom>
+          <a:solidFill>
+            <a:schemeClr val="bg1"/>
+          </a:solidFill>
+          <a:ln w="12700"/>
+        </p:spPr>
+        <p:style>
+          <a:lnRef idx="2">
+            <a:schemeClr val="accent1">
+              <a:shade val="50000"/>
+            </a:schemeClr>
+          </a:lnRef>
+          <a:fillRef idx="1">
+            <a:schemeClr val="accent1"/>
+          </a:fillRef>
+          <a:effectRef idx="0">
+            <a:schemeClr val="accent1"/>
+          </a:effectRef>
+          <a:fontRef idx="minor">
+            <a:schemeClr val="lt1"/>
+          </a:fontRef>
+        </p:style>
+        <p:txBody>
+          <a:bodyPr rtlCol="0" anchor="t"/>
+          <a:lstStyle/>
+          <a:p>
+            <a:r>
+              <a:rPr lang="en-US" b="1" dirty="0">
+                <a:solidFill>
+                  <a:schemeClr val="tx1"/>
+                </a:solidFill>
+              </a:rPr>
+              <a:t>Key Takeaways:</a:t>
+            </a:r>
+          </a:p>
+          <a:p>
+            <a:endParaRPr lang="en-US" sz="1600" b="1" dirty="0">
+              <a:solidFill>
+                <a:schemeClr val="tx1"/>
+              </a:solidFill>
+            </a:endParaRPr>
+          </a:p>
+          <a:p>
+            <a:pPr marL="285750" indent="-285750">
+              <a:buFontTx/>
+              <a:buChar char="-"/>
+            </a:pPr>
+            <a:r>
+              <a:rPr lang="en-US" sz="1600" dirty="0">
+                <a:solidFill>
+                  <a:schemeClr val="tx1"/>
+                </a:solidFill>
+              </a:rPr>
+              <a:t>Covid Start Date in NYC is listed as March 1st </a:t>
+            </a:r>
+          </a:p>
+          <a:p>
+            <a:pPr marL="285750" indent="-285750">
+              <a:buFontTx/>
+              <a:buChar char="-"/>
+            </a:pPr>
+            <a:r>
+              <a:rPr lang="en-US" sz="1600" dirty="0">
+                <a:solidFill>
+                  <a:schemeClr val="tx1"/>
+                </a:solidFill>
+              </a:rPr>
+              <a:t>Covid Peak in NYC is in January 2021</a:t>
+            </a:r>
+          </a:p>
+          <a:p>
+            <a:pPr marL="285750" indent="-285750">
+              <a:buFontTx/>
+              <a:buChar char="-"/>
+            </a:pPr>
+            <a:r>
+              <a:rPr lang="en-US" sz="1600" dirty="0">
+                <a:solidFill>
+                  <a:schemeClr val="tx1"/>
+                </a:solidFill>
+              </a:rPr>
+              <a:t>Queens and Brooklyn saw the highest number of cases of Covid </a:t>
+            </a:r>
+          </a:p>
+          <a:p>
+            <a:pPr marL="285750" indent="-285750">
+              <a:buFontTx/>
+              <a:buChar char="-"/>
+            </a:pPr>
+            <a:r>
+              <a:rPr lang="en-US" sz="1600" dirty="0">
+                <a:solidFill>
+                  <a:schemeClr val="tx1"/>
+                </a:solidFill>
+              </a:rPr>
+              <a:t>Staten Island and Manhattan experienced the lowest numbers of the five boroughs</a:t>
+            </a:r>
+          </a:p>
+          <a:p>
+            <a:pPr marL="285750" indent="-285750">
+              <a:buFontTx/>
+              <a:buChar char="-"/>
+            </a:pPr>
+            <a:endParaRPr lang="en-US" dirty="0">
+              <a:solidFill>
+                <a:schemeClr val="tx1"/>
+              </a:solidFill>
+            </a:endParaRPr>
+          </a:p>
+        </p:txBody>
+      </p:sp>
     </p:spTree>
     <p:extLst>
       <p:ext uri="{BB962C8B-B14F-4D97-AF65-F5344CB8AC3E}">
         <p14:creationId xmlns:p14="http://schemas.microsoft.com/office/powerpoint/2010/main" val="3472992963"/>
+      </p:ext>
+    </p:extLst>
+  </p:cSld>
+  <p:clrMapOvr>
+    <a:masterClrMapping/>
+  </p:clrMapOvr>
+</p:sld>
+</file>
+
+<file path=ppt/slides/slide9.xml><?xml version="1.0" encoding="utf-8"?>
+<p:sld xmlns:a="http://schemas.openxmlformats.org/drawingml/2006/main" xmlns:r="http://schemas.openxmlformats.org/officeDocument/2006/relationships" xmlns:p="http://schemas.openxmlformats.org/presentationml/2006/main">
+  <p:cSld>
+    <p:spTree>
+      <p:nvGrpSpPr>
+        <p:cNvPr id="1" name=""/>
+        <p:cNvGrpSpPr/>
+        <p:nvPr/>
+      </p:nvGrpSpPr>
+      <p:grpSpPr>
+        <a:xfrm>
+          <a:off x="0" y="0"/>
+          <a:ext cx="0" cy="0"/>
+          <a:chOff x="0" y="0"/>
+          <a:chExt cx="0" cy="0"/>
+        </a:xfrm>
+      </p:grpSpPr>
+      <p:sp>
+        <p:nvSpPr>
+          <p:cNvPr id="2" name="Title 1">
+            <a:extLst>
+              <a:ext uri="{FF2B5EF4-FFF2-40B4-BE49-F238E27FC236}">
+                <a16:creationId xmlns:a16="http://schemas.microsoft.com/office/drawing/2014/main" id="{92A9B60F-7F68-48F6-9FB9-2CF291C61653}"/>
+              </a:ext>
+            </a:extLst>
+          </p:cNvPr>
+          <p:cNvSpPr>
+            <a:spLocks noGrp="1"/>
+          </p:cNvSpPr>
+          <p:nvPr>
+            <p:ph type="title"/>
+          </p:nvPr>
+        </p:nvSpPr>
+        <p:spPr/>
+        <p:txBody>
+          <a:bodyPr/>
+          <a:lstStyle/>
+          <a:p>
+            <a:r>
+              <a:rPr lang="en-US" dirty="0"/>
+              <a:t>Street Easy Rent Data </a:t>
+            </a:r>
+          </a:p>
+        </p:txBody>
+      </p:sp>
+      <p:pic>
+        <p:nvPicPr>
+          <p:cNvPr id="4" name="Picture 3">
+            <a:extLst>
+              <a:ext uri="{FF2B5EF4-FFF2-40B4-BE49-F238E27FC236}">
+                <a16:creationId xmlns:a16="http://schemas.microsoft.com/office/drawing/2014/main" id="{5BF8F774-5544-44EE-A728-A59B0D471603}"/>
+              </a:ext>
+            </a:extLst>
+          </p:cNvPr>
+          <p:cNvPicPr>
+            <a:picLocks noChangeAspect="1"/>
+          </p:cNvPicPr>
+          <p:nvPr/>
+        </p:nvPicPr>
+        <p:blipFill>
+          <a:blip r:embed="rId3">
+            <a:extLst>
+              <a:ext uri="{28A0092B-C50C-407E-A947-70E740481C1C}">
+                <a14:useLocalDpi xmlns:a14="http://schemas.microsoft.com/office/drawing/2010/main" val="0"/>
+              </a:ext>
+            </a:extLst>
+          </a:blip>
+          <a:srcRect/>
+          <a:stretch/>
+        </p:blipFill>
+        <p:spPr>
+          <a:xfrm>
+            <a:off x="1163955" y="1844332"/>
+            <a:ext cx="8065770" cy="4324472"/>
+          </a:xfrm>
+          <a:prstGeom prst="rect">
+            <a:avLst/>
+          </a:prstGeom>
+          <a:ln>
+            <a:solidFill>
+              <a:schemeClr val="tx1"/>
+            </a:solidFill>
+          </a:ln>
+        </p:spPr>
+      </p:pic>
+      <p:sp>
+        <p:nvSpPr>
+          <p:cNvPr id="5" name="Rectangle 4">
+            <a:extLst>
+              <a:ext uri="{FF2B5EF4-FFF2-40B4-BE49-F238E27FC236}">
+                <a16:creationId xmlns:a16="http://schemas.microsoft.com/office/drawing/2014/main" id="{B2E9AF01-269C-41F1-AE19-40DA7D48E507}"/>
+              </a:ext>
+            </a:extLst>
+          </p:cNvPr>
+          <p:cNvSpPr/>
+          <p:nvPr/>
+        </p:nvSpPr>
+        <p:spPr>
+          <a:xfrm>
+            <a:off x="9401175" y="1844332"/>
+            <a:ext cx="2667000" cy="4324473"/>
+          </a:xfrm>
+          <a:prstGeom prst="rect">
+            <a:avLst/>
+          </a:prstGeom>
+          <a:solidFill>
+            <a:schemeClr val="bg1"/>
+          </a:solidFill>
+          <a:ln w="12700"/>
+        </p:spPr>
+        <p:style>
+          <a:lnRef idx="2">
+            <a:schemeClr val="accent1">
+              <a:shade val="50000"/>
+            </a:schemeClr>
+          </a:lnRef>
+          <a:fillRef idx="1">
+            <a:schemeClr val="accent1"/>
+          </a:fillRef>
+          <a:effectRef idx="0">
+            <a:schemeClr val="accent1"/>
+          </a:effectRef>
+          <a:fontRef idx="minor">
+            <a:schemeClr val="lt1"/>
+          </a:fontRef>
+        </p:style>
+        <p:txBody>
+          <a:bodyPr rtlCol="0" anchor="t"/>
+          <a:lstStyle/>
+          <a:p>
+            <a:r>
+              <a:rPr lang="en-US" b="1" dirty="0">
+                <a:solidFill>
+                  <a:schemeClr val="tx1"/>
+                </a:solidFill>
+              </a:rPr>
+              <a:t>Key Takeaways:</a:t>
+            </a:r>
+          </a:p>
+          <a:p>
+            <a:endParaRPr lang="en-US" sz="1600" b="1" dirty="0">
+              <a:solidFill>
+                <a:schemeClr val="tx1"/>
+              </a:solidFill>
+            </a:endParaRPr>
+          </a:p>
+          <a:p>
+            <a:pPr marL="285750" indent="-285750">
+              <a:buFontTx/>
+              <a:buChar char="-"/>
+            </a:pPr>
+            <a:r>
+              <a:rPr lang="en-US" sz="1600" dirty="0">
+                <a:solidFill>
+                  <a:schemeClr val="tx1"/>
+                </a:solidFill>
+              </a:rPr>
+              <a:t>Rents were increasingly consistently from 2010 through the beginning of 2020 </a:t>
+            </a:r>
+          </a:p>
+          <a:p>
+            <a:pPr marL="285750" indent="-285750">
+              <a:buFontTx/>
+              <a:buChar char="-"/>
+            </a:pPr>
+            <a:r>
+              <a:rPr lang="en-US" sz="1600" dirty="0">
+                <a:solidFill>
+                  <a:schemeClr val="tx1"/>
+                </a:solidFill>
+              </a:rPr>
+              <a:t>After the first Covid case in NYC (marked by the red line), rents started dropping significantly for Manhattan and Brooklyn </a:t>
+            </a:r>
+          </a:p>
+          <a:p>
+            <a:endParaRPr lang="en-US" sz="1600" dirty="0">
+              <a:solidFill>
+                <a:schemeClr val="tx1"/>
+              </a:solidFill>
+            </a:endParaRPr>
+          </a:p>
+          <a:p>
+            <a:pPr marL="285750" indent="-285750">
+              <a:buFontTx/>
+              <a:buChar char="-"/>
+            </a:pPr>
+            <a:endParaRPr lang="en-US" dirty="0">
+              <a:solidFill>
+                <a:schemeClr val="tx1"/>
+              </a:solidFill>
+            </a:endParaRPr>
+          </a:p>
+        </p:txBody>
+      </p:sp>
+      <p:cxnSp>
+        <p:nvCxnSpPr>
+          <p:cNvPr id="6" name="Straight Connector 5">
+            <a:extLst>
+              <a:ext uri="{FF2B5EF4-FFF2-40B4-BE49-F238E27FC236}">
+                <a16:creationId xmlns:a16="http://schemas.microsoft.com/office/drawing/2014/main" id="{7110F110-0206-4F8D-8B70-EEF84A281CF2}"/>
+              </a:ext>
+            </a:extLst>
+          </p:cNvPr>
+          <p:cNvCxnSpPr>
+            <a:cxnSpLocks/>
+          </p:cNvCxnSpPr>
+          <p:nvPr/>
+        </p:nvCxnSpPr>
+        <p:spPr>
+          <a:xfrm>
+            <a:off x="7991475" y="1844332"/>
+            <a:ext cx="0" cy="3946868"/>
+          </a:xfrm>
+          <a:prstGeom prst="line">
+            <a:avLst/>
+          </a:prstGeom>
+          <a:ln>
+            <a:solidFill>
+              <a:srgbClr val="FF0000"/>
+            </a:solidFill>
+          </a:ln>
+        </p:spPr>
+        <p:style>
+          <a:lnRef idx="1">
+            <a:schemeClr val="accent1"/>
+          </a:lnRef>
+          <a:fillRef idx="0">
+            <a:schemeClr val="accent1"/>
+          </a:fillRef>
+          <a:effectRef idx="0">
+            <a:schemeClr val="accent1"/>
+          </a:effectRef>
+          <a:fontRef idx="minor">
+            <a:schemeClr val="tx1"/>
+          </a:fontRef>
+        </p:style>
+      </p:cxnSp>
+    </p:spTree>
+    <p:extLst>
+      <p:ext uri="{BB962C8B-B14F-4D97-AF65-F5344CB8AC3E}">
+        <p14:creationId xmlns:p14="http://schemas.microsoft.com/office/powerpoint/2010/main" val="2285805491"/>
       </p:ext>
     </p:extLst>
   </p:cSld>

</xml_diff>

<commit_message>
Final changes to ppt presentation
</commit_message>
<xml_diff>
--- a/Covid-19 and the NYC Apartment Market.pptx
+++ b/Covid-19 and the NYC Apartment Market.pptx
@@ -144,7 +144,7 @@
   <pc:docChgLst>
     <pc:chgData name="jack copeland" userId="c1f67f945e5b5c42" providerId="LiveId" clId="{61313348-D28B-4C2B-88EF-82071CA11326}"/>
     <pc:docChg chg="undo redo custSel addSld delSld modSld sldOrd">
-      <pc:chgData name="jack copeland" userId="c1f67f945e5b5c42" providerId="LiveId" clId="{61313348-D28B-4C2B-88EF-82071CA11326}" dt="2021-10-17T17:20:02.066" v="3186" actId="14826"/>
+      <pc:chgData name="jack copeland" userId="c1f67f945e5b5c42" providerId="LiveId" clId="{61313348-D28B-4C2B-88EF-82071CA11326}" dt="2021-10-17T22:10:03.982" v="3440" actId="20577"/>
       <pc:docMkLst>
         <pc:docMk/>
       </pc:docMkLst>
@@ -1234,7 +1234,7 @@
         </pc:cxnChg>
       </pc:sldChg>
       <pc:sldChg chg="addSp delSp modSp add mod setBg">
-        <pc:chgData name="jack copeland" userId="c1f67f945e5b5c42" providerId="LiveId" clId="{61313348-D28B-4C2B-88EF-82071CA11326}" dt="2021-10-17T17:20:02.066" v="3186" actId="14826"/>
+        <pc:chgData name="jack copeland" userId="c1f67f945e5b5c42" providerId="LiveId" clId="{61313348-D28B-4C2B-88EF-82071CA11326}" dt="2021-10-17T22:10:03.982" v="3440" actId="20577"/>
         <pc:sldMkLst>
           <pc:docMk/>
           <pc:sldMk cId="2398329897" sldId="268"/>
@@ -1288,7 +1288,7 @@
           </ac:spMkLst>
         </pc:spChg>
         <pc:spChg chg="add mod">
-          <ac:chgData name="jack copeland" userId="c1f67f945e5b5c42" providerId="LiveId" clId="{61313348-D28B-4C2B-88EF-82071CA11326}" dt="2021-10-15T20:02:09.486" v="1828" actId="20577"/>
+          <ac:chgData name="jack copeland" userId="c1f67f945e5b5c42" providerId="LiveId" clId="{61313348-D28B-4C2B-88EF-82071CA11326}" dt="2021-10-17T22:10:03.982" v="3440" actId="20577"/>
           <ac:spMkLst>
             <pc:docMk/>
             <pc:sldMk cId="2398329897" sldId="268"/>
@@ -27931,6 +27931,113 @@
             </a:endParaRPr>
           </a:p>
           <a:p>
+            <a:pPr marL="285750" indent="-285750">
+              <a:buFont typeface="Arial" panose="020B0604020202020204" pitchFamily="34" charset="0"/>
+              <a:buChar char="•"/>
+            </a:pPr>
+            <a:r>
+              <a:rPr lang="en-US" sz="1600" dirty="0">
+                <a:solidFill>
+                  <a:schemeClr val="tx1"/>
+                </a:solidFill>
+              </a:rPr>
+              <a:t>Highest correlations to drop in rental prices:</a:t>
+            </a:r>
+          </a:p>
+          <a:p>
+            <a:pPr marL="742950" lvl="1" indent="-285750">
+              <a:buFont typeface="Arial" panose="020B0604020202020204" pitchFamily="34" charset="0"/>
+              <a:buChar char="•"/>
+            </a:pPr>
+            <a:r>
+              <a:rPr lang="en-US" sz="1600" dirty="0">
+                <a:solidFill>
+                  <a:schemeClr val="tx1"/>
+                </a:solidFill>
+              </a:rPr>
+              <a:t>Pre-Covid Rent</a:t>
+            </a:r>
+          </a:p>
+          <a:p>
+            <a:pPr marL="1200150" lvl="2" indent="-285750">
+              <a:buFont typeface="Arial" panose="020B0604020202020204" pitchFamily="34" charset="0"/>
+              <a:buChar char="•"/>
+            </a:pPr>
+            <a:r>
+              <a:rPr lang="en-US" sz="1600" dirty="0">
+                <a:solidFill>
+                  <a:schemeClr val="tx1"/>
+                </a:solidFill>
+              </a:rPr>
+              <a:t>The more expensive, the greater the decline</a:t>
+            </a:r>
+          </a:p>
+          <a:p>
+            <a:pPr marL="742950" lvl="1" indent="-285750">
+              <a:buFont typeface="Arial" panose="020B0604020202020204" pitchFamily="34" charset="0"/>
+              <a:buChar char="•"/>
+            </a:pPr>
+            <a:r>
+              <a:rPr lang="en-US" sz="1600" dirty="0">
+                <a:solidFill>
+                  <a:schemeClr val="tx1"/>
+                </a:solidFill>
+              </a:rPr>
+              <a:t>Total Housing Units in 2020</a:t>
+            </a:r>
+          </a:p>
+          <a:p>
+            <a:pPr marL="285750" indent="-285750">
+              <a:buFont typeface="Arial" panose="020B0604020202020204" pitchFamily="34" charset="0"/>
+              <a:buChar char="•"/>
+            </a:pPr>
+            <a:endParaRPr lang="en-US" sz="1600" dirty="0">
+              <a:solidFill>
+                <a:schemeClr val="tx1"/>
+              </a:solidFill>
+            </a:endParaRPr>
+          </a:p>
+          <a:p>
+            <a:pPr marL="285750" indent="-285750">
+              <a:buFont typeface="Arial" panose="020B0604020202020204" pitchFamily="34" charset="0"/>
+              <a:buChar char="•"/>
+            </a:pPr>
+            <a:r>
+              <a:rPr lang="en-US" sz="1600" dirty="0">
+                <a:solidFill>
+                  <a:schemeClr val="tx1"/>
+                </a:solidFill>
+              </a:rPr>
+              <a:t>Lowest correlations to drop in rental prices:</a:t>
+            </a:r>
+          </a:p>
+          <a:p>
+            <a:pPr marL="742950" lvl="1" indent="-285750">
+              <a:buFont typeface="Arial" panose="020B0604020202020204" pitchFamily="34" charset="0"/>
+              <a:buChar char="•"/>
+            </a:pPr>
+            <a:r>
+              <a:rPr lang="en-US" sz="1600" dirty="0">
+                <a:solidFill>
+                  <a:schemeClr val="tx1"/>
+                </a:solidFill>
+              </a:rPr>
+              <a:t>Total Covid cases</a:t>
+            </a:r>
+          </a:p>
+          <a:p>
+            <a:pPr marL="742950" lvl="1" indent="-285750">
+              <a:buFont typeface="Arial" panose="020B0604020202020204" pitchFamily="34" charset="0"/>
+              <a:buChar char="•"/>
+            </a:pPr>
+            <a:r>
+              <a:rPr lang="en-US" sz="1600">
+                <a:solidFill>
+                  <a:schemeClr val="tx1"/>
+                </a:solidFill>
+              </a:rPr>
+              <a:t>Population under 18</a:t>
+            </a:r>
             <a:endParaRPr lang="en-US" sz="1600" dirty="0">
               <a:solidFill>
                 <a:schemeClr val="tx1"/>

</xml_diff>